<commit_message>
CSS codes added for 19th Sept
</commit_message>
<xml_diff>
--- a/CSS.pptx
+++ b/CSS.pptx
@@ -41,6 +41,7 @@
     <p:sldId id="377" r:id="rId35"/>
     <p:sldId id="378" r:id="rId36"/>
     <p:sldId id="379" r:id="rId37"/>
+    <p:sldId id="381" r:id="rId38"/>
   </p:sldIdLst>
   <p:sldSz cx="12192000" cy="6858000"/>
   <p:notesSz cx="12192000" cy="6858000"/>
@@ -297,7 +298,7 @@
           <a:p>
             <a:fld id="{1D8BD707-D9CF-40AE-B4C6-C98DA3205C09}" type="datetimeFigureOut">
               <a:rPr lang="en-US"/>
-              <a:t>9/17/2023</a:t>
+              <a:t>9/19/2023</a:t>
             </a:fld>
             <a:endParaRPr lang="en-US"/>
           </a:p>
@@ -474,7 +475,7 @@
           <a:p>
             <a:fld id="{1D8BD707-D9CF-40AE-B4C6-C98DA3205C09}" type="datetimeFigureOut">
               <a:rPr lang="en-US"/>
-              <a:t>9/17/2023</a:t>
+              <a:t>9/19/2023</a:t>
             </a:fld>
             <a:endParaRPr lang="en-US"/>
           </a:p>
@@ -688,7 +689,7 @@
           <a:p>
             <a:fld id="{1D8BD707-D9CF-40AE-B4C6-C98DA3205C09}" type="datetimeFigureOut">
               <a:rPr lang="en-US"/>
-              <a:t>9/17/2023</a:t>
+              <a:t>9/19/2023</a:t>
             </a:fld>
             <a:endParaRPr lang="en-US"/>
           </a:p>
@@ -836,7 +837,7 @@
           <a:p>
             <a:fld id="{1D8BD707-D9CF-40AE-B4C6-C98DA3205C09}" type="datetimeFigureOut">
               <a:rPr lang="en-US"/>
-              <a:t>9/17/2023</a:t>
+              <a:t>9/19/2023</a:t>
             </a:fld>
             <a:endParaRPr lang="en-US"/>
           </a:p>
@@ -963,7 +964,7 @@
           <a:p>
             <a:fld id="{1D8BD707-D9CF-40AE-B4C6-C98DA3205C09}" type="datetimeFigureOut">
               <a:rPr lang="en-US"/>
-              <a:t>9/17/2023</a:t>
+              <a:t>9/19/2023</a:t>
             </a:fld>
             <a:endParaRPr lang="en-US"/>
           </a:p>
@@ -1217,7 +1218,7 @@
           <a:p>
             <a:fld id="{1D8BD707-D9CF-40AE-B4C6-C98DA3205C09}" type="datetimeFigureOut">
               <a:rPr lang="en-US"/>
-              <a:t>9/17/2023</a:t>
+              <a:t>9/19/2023</a:t>
             </a:fld>
             <a:endParaRPr lang="en-US"/>
           </a:p>
@@ -10358,6 +10359,319 @@
     <p:extLst>
       <p:ext uri="{BB962C8B-B14F-4D97-AF65-F5344CB8AC3E}">
         <p14:creationId xmlns:p14="http://schemas.microsoft.com/office/powerpoint/2010/main" val="4241721794"/>
+      </p:ext>
+    </p:extLst>
+  </p:cSld>
+  <p:clrMapOvr>
+    <a:masterClrMapping/>
+  </p:clrMapOvr>
+</p:sld>
+</file>
+
+<file path=ppt/slides/slide37.xml><?xml version="1.0" encoding="utf-8"?>
+<p:sld xmlns:a="http://schemas.openxmlformats.org/drawingml/2006/main" xmlns:r="http://schemas.openxmlformats.org/officeDocument/2006/relationships" xmlns:p="http://schemas.openxmlformats.org/presentationml/2006/main">
+  <p:cSld>
+    <p:spTree>
+      <p:nvGrpSpPr>
+        <p:cNvPr id="1" name=""/>
+        <p:cNvGrpSpPr/>
+        <p:nvPr/>
+      </p:nvGrpSpPr>
+      <p:grpSpPr>
+        <a:xfrm>
+          <a:off x="0" y="0"/>
+          <a:ext cx="0" cy="0"/>
+          <a:chOff x="0" y="0"/>
+          <a:chExt cx="0" cy="0"/>
+        </a:xfrm>
+      </p:grpSpPr>
+      <p:sp>
+        <p:nvSpPr>
+          <p:cNvPr id="2" name="object 2"/>
+          <p:cNvSpPr/>
+          <p:nvPr/>
+        </p:nvSpPr>
+        <p:spPr>
+          <a:xfrm>
+            <a:off x="12291" y="24581"/>
+            <a:ext cx="12191999" cy="7118601"/>
+          </a:xfrm>
+          <a:prstGeom prst="rect">
+            <a:avLst/>
+          </a:prstGeom>
+          <a:blipFill>
+            <a:blip r:embed="rId2" cstate="print"/>
+            <a:stretch>
+              <a:fillRect/>
+            </a:stretch>
+          </a:blipFill>
+        </p:spPr>
+        <p:txBody>
+          <a:bodyPr wrap="square" lIns="0" tIns="0" rIns="0" bIns="0" rtlCol="0"/>
+          <a:lstStyle/>
+          <a:p>
+            <a:endParaRPr b="1" dirty="0">
+              <a:ln w="13462">
+                <a:solidFill>
+                  <a:schemeClr val="bg1"/>
+                </a:solidFill>
+                <a:prstDash val="solid"/>
+              </a:ln>
+              <a:solidFill>
+                <a:schemeClr val="tx1">
+                  <a:lumMod val="85000"/>
+                  <a:lumOff val="15000"/>
+                </a:schemeClr>
+              </a:solidFill>
+              <a:effectLst>
+                <a:outerShdw dist="38100" dir="2700000" algn="bl" rotWithShape="0">
+                  <a:schemeClr val="accent5"/>
+                </a:outerShdw>
+              </a:effectLst>
+            </a:endParaRPr>
+          </a:p>
+        </p:txBody>
+      </p:sp>
+      <p:sp>
+        <p:nvSpPr>
+          <p:cNvPr id="3" name="object 3"/>
+          <p:cNvSpPr txBox="1">
+            <a:spLocks noGrp="1"/>
+          </p:cNvSpPr>
+          <p:nvPr>
+            <p:ph type="title"/>
+          </p:nvPr>
+        </p:nvSpPr>
+        <p:spPr>
+          <a:xfrm>
+            <a:off x="938885" y="533400"/>
+            <a:ext cx="4471315" cy="535403"/>
+          </a:xfrm>
+          <a:prstGeom prst="rect">
+            <a:avLst/>
+          </a:prstGeom>
+        </p:spPr>
+        <p:txBody>
+          <a:bodyPr vert="horz" wrap="square" lIns="0" tIns="12065" rIns="0" bIns="0" rtlCol="0">
+            <a:spAutoFit/>
+          </a:bodyPr>
+          <a:lstStyle/>
+          <a:p>
+            <a:pPr marL="12700">
+              <a:lnSpc>
+                <a:spcPct val="100000"/>
+              </a:lnSpc>
+              <a:spcBef>
+                <a:spcPts val="95"/>
+              </a:spcBef>
+            </a:pPr>
+            <a:r>
+              <a:rPr lang="en-US" sz="3400" dirty="0">
+                <a:latin typeface="Carlito"/>
+                <a:cs typeface="Carlito"/>
+              </a:rPr>
+              <a:t>Media Query	</a:t>
+            </a:r>
+            <a:endParaRPr sz="3400" dirty="0">
+              <a:latin typeface="Carlito"/>
+              <a:cs typeface="Carlito"/>
+            </a:endParaRPr>
+          </a:p>
+        </p:txBody>
+      </p:sp>
+      <p:sp>
+        <p:nvSpPr>
+          <p:cNvPr id="5" name="object 5"/>
+          <p:cNvSpPr/>
+          <p:nvPr/>
+        </p:nvSpPr>
+        <p:spPr>
+          <a:xfrm>
+            <a:off x="9816083" y="262127"/>
+            <a:ext cx="1976627" cy="822960"/>
+          </a:xfrm>
+          <a:prstGeom prst="rect">
+            <a:avLst/>
+          </a:prstGeom>
+          <a:blipFill>
+            <a:blip r:embed="rId3" cstate="print"/>
+            <a:stretch>
+              <a:fillRect/>
+            </a:stretch>
+          </a:blipFill>
+        </p:spPr>
+        <p:txBody>
+          <a:bodyPr wrap="square" lIns="0" tIns="0" rIns="0" bIns="0" rtlCol="0"/>
+          <a:lstStyle/>
+          <a:p>
+            <a:endParaRPr/>
+          </a:p>
+        </p:txBody>
+      </p:sp>
+      <p:sp>
+        <p:nvSpPr>
+          <p:cNvPr id="7" name="TextBox 6">
+            <a:extLst>
+              <a:ext uri="{FF2B5EF4-FFF2-40B4-BE49-F238E27FC236}">
+                <a16:creationId xmlns:a16="http://schemas.microsoft.com/office/drawing/2014/main" id="{C2428796-F632-00B4-E484-CA738D260150}"/>
+              </a:ext>
+            </a:extLst>
+          </p:cNvPr>
+          <p:cNvSpPr txBox="1"/>
+          <p:nvPr/>
+        </p:nvSpPr>
+        <p:spPr>
+          <a:xfrm>
+            <a:off x="914400" y="1219200"/>
+            <a:ext cx="11049000" cy="5016758"/>
+          </a:xfrm>
+          <a:prstGeom prst="rect">
+            <a:avLst/>
+          </a:prstGeom>
+          <a:noFill/>
+        </p:spPr>
+        <p:txBody>
+          <a:bodyPr wrap="square" rtlCol="0">
+            <a:spAutoFit/>
+          </a:bodyPr>
+          <a:lstStyle/>
+          <a:p>
+            <a:r>
+              <a:rPr lang="en-US" sz="3200" dirty="0">
+                <a:solidFill>
+                  <a:schemeClr val="bg1"/>
+                </a:solidFill>
+                <a:latin typeface="+mj-lt"/>
+                <a:sym typeface="Wingdings" panose="05000000000000000000" pitchFamily="2" charset="2"/>
+              </a:rPr>
+              <a:t>@media [target-&gt; (screen , print and all)] and (situations)</a:t>
+            </a:r>
+          </a:p>
+          <a:p>
+            <a:r>
+              <a:rPr lang="en-US" sz="3200" dirty="0">
+                <a:solidFill>
+                  <a:schemeClr val="bg1"/>
+                </a:solidFill>
+                <a:latin typeface="+mj-lt"/>
+                <a:sym typeface="Wingdings" panose="05000000000000000000" pitchFamily="2" charset="2"/>
+              </a:rPr>
+              <a:t>Situations e.g.:</a:t>
+            </a:r>
+          </a:p>
+          <a:p>
+            <a:r>
+              <a:rPr lang="en-US" sz="3200" dirty="0">
+                <a:solidFill>
+                  <a:schemeClr val="bg1"/>
+                </a:solidFill>
+                <a:latin typeface="+mj-lt"/>
+                <a:sym typeface="Wingdings" panose="05000000000000000000" pitchFamily="2" charset="2"/>
+              </a:rPr>
+              <a:t>1.max-width:800px; (Note: Bigger values will come first)</a:t>
+            </a:r>
+          </a:p>
+          <a:p>
+            <a:endParaRPr lang="en-US" sz="3200" dirty="0">
+              <a:solidFill>
+                <a:schemeClr val="bg1"/>
+              </a:solidFill>
+              <a:latin typeface="+mj-lt"/>
+              <a:sym typeface="Wingdings" panose="05000000000000000000" pitchFamily="2" charset="2"/>
+            </a:endParaRPr>
+          </a:p>
+          <a:p>
+            <a:r>
+              <a:rPr lang="en-US" sz="3200" dirty="0">
+                <a:solidFill>
+                  <a:schemeClr val="bg1"/>
+                </a:solidFill>
+                <a:latin typeface="+mj-lt"/>
+                <a:sym typeface="Wingdings" panose="05000000000000000000" pitchFamily="2" charset="2"/>
+              </a:rPr>
+              <a:t>2.min-width:200px; (Note: Smaller values will come first)</a:t>
+            </a:r>
+          </a:p>
+          <a:p>
+            <a:endParaRPr lang="en-US" sz="3200" dirty="0">
+              <a:solidFill>
+                <a:schemeClr val="bg1"/>
+              </a:solidFill>
+              <a:latin typeface="+mj-lt"/>
+              <a:sym typeface="Wingdings" panose="05000000000000000000" pitchFamily="2" charset="2"/>
+            </a:endParaRPr>
+          </a:p>
+          <a:p>
+            <a:r>
+              <a:rPr lang="en-US" sz="3200" dirty="0">
+                <a:solidFill>
+                  <a:schemeClr val="bg1"/>
+                </a:solidFill>
+                <a:latin typeface="+mj-lt"/>
+                <a:sym typeface="Wingdings" panose="05000000000000000000" pitchFamily="2" charset="2"/>
+              </a:rPr>
+              <a:t>3.Orientation </a:t>
+            </a:r>
+            <a:r>
+              <a:rPr lang="en-US" sz="3200">
+                <a:solidFill>
+                  <a:schemeClr val="bg1"/>
+                </a:solidFill>
+                <a:latin typeface="+mj-lt"/>
+                <a:sym typeface="Wingdings" panose="05000000000000000000" pitchFamily="2" charset="2"/>
+              </a:rPr>
+              <a:t>: landscape</a:t>
+            </a:r>
+            <a:r>
+              <a:rPr lang="en-US" sz="3200" dirty="0">
+                <a:solidFill>
+                  <a:schemeClr val="bg1"/>
+                </a:solidFill>
+                <a:latin typeface="+mj-lt"/>
+                <a:sym typeface="Wingdings" panose="05000000000000000000" pitchFamily="2" charset="2"/>
+              </a:rPr>
+              <a:t>/portrait</a:t>
+            </a:r>
+          </a:p>
+          <a:p>
+            <a:r>
+              <a:rPr lang="en-US" sz="3200" dirty="0">
+                <a:solidFill>
+                  <a:schemeClr val="bg1"/>
+                </a:solidFill>
+                <a:latin typeface="+mj-lt"/>
+                <a:sym typeface="Wingdings" panose="05000000000000000000" pitchFamily="2" charset="2"/>
+              </a:rPr>
+              <a:t>Most Used Breakpoints:</a:t>
+            </a:r>
+          </a:p>
+          <a:p>
+            <a:r>
+              <a:rPr lang="en-US" sz="3200" dirty="0">
+                <a:solidFill>
+                  <a:schemeClr val="bg1"/>
+                </a:solidFill>
+                <a:latin typeface="+mj-lt"/>
+                <a:sym typeface="Wingdings" panose="05000000000000000000" pitchFamily="2" charset="2"/>
+              </a:rPr>
+              <a:t>1200px , 991px, 767px, 576px</a:t>
+            </a:r>
+          </a:p>
+          <a:p>
+            <a:endParaRPr lang="en-US" sz="3200" dirty="0">
+              <a:solidFill>
+                <a:schemeClr val="bg1"/>
+              </a:solidFill>
+              <a:latin typeface="+mj-lt"/>
+              <a:sym typeface="Wingdings" panose="05000000000000000000" pitchFamily="2" charset="2"/>
+            </a:endParaRPr>
+          </a:p>
+        </p:txBody>
+      </p:sp>
+    </p:spTree>
+    <p:extLst>
+      <p:ext uri="{BB962C8B-B14F-4D97-AF65-F5344CB8AC3E}">
+        <p14:creationId xmlns:p14="http://schemas.microsoft.com/office/powerpoint/2010/main" val="1394612101"/>
       </p:ext>
     </p:extLst>
   </p:cSld>

</xml_diff>

<commit_message>
CSS codes added for 4th oct
</commit_message>
<xml_diff>
--- a/CSS.pptx
+++ b/CSS.pptx
@@ -42,6 +42,17 @@
     <p:sldId id="378" r:id="rId36"/>
     <p:sldId id="379" r:id="rId37"/>
     <p:sldId id="381" r:id="rId38"/>
+    <p:sldId id="382" r:id="rId39"/>
+    <p:sldId id="383" r:id="rId40"/>
+    <p:sldId id="384" r:id="rId41"/>
+    <p:sldId id="385" r:id="rId42"/>
+    <p:sldId id="386" r:id="rId43"/>
+    <p:sldId id="387" r:id="rId44"/>
+    <p:sldId id="388" r:id="rId45"/>
+    <p:sldId id="389" r:id="rId46"/>
+    <p:sldId id="390" r:id="rId47"/>
+    <p:sldId id="391" r:id="rId48"/>
+    <p:sldId id="392" r:id="rId49"/>
   </p:sldIdLst>
   <p:sldSz cx="12192000" cy="6858000"/>
   <p:notesSz cx="12192000" cy="6858000"/>
@@ -298,7 +309,7 @@
           <a:p>
             <a:fld id="{1D8BD707-D9CF-40AE-B4C6-C98DA3205C09}" type="datetimeFigureOut">
               <a:rPr lang="en-US"/>
-              <a:t>9/19/2023</a:t>
+              <a:t>10/4/2023</a:t>
             </a:fld>
             <a:endParaRPr lang="en-US"/>
           </a:p>
@@ -475,7 +486,7 @@
           <a:p>
             <a:fld id="{1D8BD707-D9CF-40AE-B4C6-C98DA3205C09}" type="datetimeFigureOut">
               <a:rPr lang="en-US"/>
-              <a:t>9/19/2023</a:t>
+              <a:t>10/4/2023</a:t>
             </a:fld>
             <a:endParaRPr lang="en-US"/>
           </a:p>
@@ -689,7 +700,7 @@
           <a:p>
             <a:fld id="{1D8BD707-D9CF-40AE-B4C6-C98DA3205C09}" type="datetimeFigureOut">
               <a:rPr lang="en-US"/>
-              <a:t>9/19/2023</a:t>
+              <a:t>10/4/2023</a:t>
             </a:fld>
             <a:endParaRPr lang="en-US"/>
           </a:p>
@@ -837,7 +848,7 @@
           <a:p>
             <a:fld id="{1D8BD707-D9CF-40AE-B4C6-C98DA3205C09}" type="datetimeFigureOut">
               <a:rPr lang="en-US"/>
-              <a:t>9/19/2023</a:t>
+              <a:t>10/4/2023</a:t>
             </a:fld>
             <a:endParaRPr lang="en-US"/>
           </a:p>
@@ -964,7 +975,7 @@
           <a:p>
             <a:fld id="{1D8BD707-D9CF-40AE-B4C6-C98DA3205C09}" type="datetimeFigureOut">
               <a:rPr lang="en-US"/>
-              <a:t>9/19/2023</a:t>
+              <a:t>10/4/2023</a:t>
             </a:fld>
             <a:endParaRPr lang="en-US"/>
           </a:p>
@@ -1218,7 +1229,7 @@
           <a:p>
             <a:fld id="{1D8BD707-D9CF-40AE-B4C6-C98DA3205C09}" type="datetimeFigureOut">
               <a:rPr lang="en-US"/>
-              <a:t>9/19/2023</a:t>
+              <a:t>10/4/2023</a:t>
             </a:fld>
             <a:endParaRPr lang="en-US"/>
           </a:p>
@@ -10523,7 +10534,7 @@
         <p:spPr>
           <a:xfrm>
             <a:off x="914400" y="1219200"/>
-            <a:ext cx="11049000" cy="5016758"/>
+            <a:ext cx="11049000" cy="6001643"/>
           </a:xfrm>
           <a:prstGeom prst="rect">
             <a:avLst/>
@@ -10610,51 +10621,19 @@
                 <a:latin typeface="+mj-lt"/>
                 <a:sym typeface="Wingdings" panose="05000000000000000000" pitchFamily="2" charset="2"/>
               </a:rPr>
-              <a:t>3.Orientation </a:t>
-            </a:r>
-            <a:r>
-              <a:rPr lang="en-US" sz="3200">
+              <a:t>3.Orientation : landscape/portrait</a:t>
+            </a:r>
+          </a:p>
+          <a:p>
+            <a:r>
+              <a:rPr lang="en-US" sz="3200" dirty="0">
                 <a:solidFill>
                   <a:schemeClr val="bg1"/>
                 </a:solidFill>
                 <a:latin typeface="+mj-lt"/>
                 <a:sym typeface="Wingdings" panose="05000000000000000000" pitchFamily="2" charset="2"/>
               </a:rPr>
-              <a:t>: landscape</a:t>
-            </a:r>
-            <a:r>
-              <a:rPr lang="en-US" sz="3200" dirty="0">
-                <a:solidFill>
-                  <a:schemeClr val="bg1"/>
-                </a:solidFill>
-                <a:latin typeface="+mj-lt"/>
-                <a:sym typeface="Wingdings" panose="05000000000000000000" pitchFamily="2" charset="2"/>
-              </a:rPr>
-              <a:t>/portrait</a:t>
-            </a:r>
-          </a:p>
-          <a:p>
-            <a:r>
-              <a:rPr lang="en-US" sz="3200" dirty="0">
-                <a:solidFill>
-                  <a:schemeClr val="bg1"/>
-                </a:solidFill>
-                <a:latin typeface="+mj-lt"/>
-                <a:sym typeface="Wingdings" panose="05000000000000000000" pitchFamily="2" charset="2"/>
-              </a:rPr>
-              <a:t>Most Used Breakpoints:</a:t>
-            </a:r>
-          </a:p>
-          <a:p>
-            <a:r>
-              <a:rPr lang="en-US" sz="3200" dirty="0">
-                <a:solidFill>
-                  <a:schemeClr val="bg1"/>
-                </a:solidFill>
-                <a:latin typeface="+mj-lt"/>
-                <a:sym typeface="Wingdings" panose="05000000000000000000" pitchFamily="2" charset="2"/>
-              </a:rPr>
-              <a:t>1200px , 991px, 767px, 576px</a:t>
+              <a:t>Most Used Breakpoints: 1200px , 991px, 767px, 576px </a:t>
             </a:r>
           </a:p>
           <a:p>
@@ -10666,12 +10645,719 @@
               <a:sym typeface="Wingdings" panose="05000000000000000000" pitchFamily="2" charset="2"/>
             </a:endParaRPr>
           </a:p>
+          <a:p>
+            <a:r>
+              <a:rPr lang="en-US" sz="3200" dirty="0">
+                <a:solidFill>
+                  <a:schemeClr val="bg1"/>
+                </a:solidFill>
+                <a:latin typeface="+mj-lt"/>
+                <a:sym typeface="Wingdings" panose="05000000000000000000" pitchFamily="2" charset="2"/>
+              </a:rPr>
+              <a:t>4. Or : using ‘ , ’  for condition A or condition B</a:t>
+            </a:r>
+          </a:p>
+          <a:p>
+            <a:r>
+              <a:rPr lang="en-US" sz="3200" dirty="0">
+                <a:solidFill>
+                  <a:schemeClr val="bg1"/>
+                </a:solidFill>
+                <a:latin typeface="+mj-lt"/>
+                <a:sym typeface="Wingdings" panose="05000000000000000000" pitchFamily="2" charset="2"/>
+              </a:rPr>
+              <a:t>(</a:t>
+            </a:r>
+            <a:r>
+              <a:rPr lang="en-US" sz="3200" dirty="0" err="1">
+                <a:solidFill>
+                  <a:schemeClr val="bg1"/>
+                </a:solidFill>
+                <a:latin typeface="+mj-lt"/>
+                <a:sym typeface="Wingdings" panose="05000000000000000000" pitchFamily="2" charset="2"/>
+              </a:rPr>
+              <a:t>eg.</a:t>
+            </a:r>
+            <a:r>
+              <a:rPr lang="en-US" sz="3200" dirty="0">
+                <a:solidFill>
+                  <a:schemeClr val="bg1"/>
+                </a:solidFill>
+                <a:latin typeface="+mj-lt"/>
+                <a:sym typeface="Wingdings" panose="05000000000000000000" pitchFamily="2" charset="2"/>
+              </a:rPr>
+              <a:t> @media screen and (condition A) , (condition B) )  </a:t>
+            </a:r>
+          </a:p>
+          <a:p>
+            <a:endParaRPr lang="en-US" sz="3200" dirty="0">
+              <a:solidFill>
+                <a:schemeClr val="bg1"/>
+              </a:solidFill>
+              <a:latin typeface="+mj-lt"/>
+              <a:sym typeface="Wingdings" panose="05000000000000000000" pitchFamily="2" charset="2"/>
+            </a:endParaRPr>
+          </a:p>
         </p:txBody>
       </p:sp>
     </p:spTree>
     <p:extLst>
       <p:ext uri="{BB962C8B-B14F-4D97-AF65-F5344CB8AC3E}">
         <p14:creationId xmlns:p14="http://schemas.microsoft.com/office/powerpoint/2010/main" val="1394612101"/>
+      </p:ext>
+    </p:extLst>
+  </p:cSld>
+  <p:clrMapOvr>
+    <a:masterClrMapping/>
+  </p:clrMapOvr>
+</p:sld>
+</file>
+
+<file path=ppt/slides/slide38.xml><?xml version="1.0" encoding="utf-8"?>
+<p:sld xmlns:a="http://schemas.openxmlformats.org/drawingml/2006/main" xmlns:r="http://schemas.openxmlformats.org/officeDocument/2006/relationships" xmlns:p="http://schemas.openxmlformats.org/presentationml/2006/main">
+  <p:cSld>
+    <p:spTree>
+      <p:nvGrpSpPr>
+        <p:cNvPr id="1" name=""/>
+        <p:cNvGrpSpPr/>
+        <p:nvPr/>
+      </p:nvGrpSpPr>
+      <p:grpSpPr>
+        <a:xfrm>
+          <a:off x="0" y="0"/>
+          <a:ext cx="0" cy="0"/>
+          <a:chOff x="0" y="0"/>
+          <a:chExt cx="0" cy="0"/>
+        </a:xfrm>
+      </p:grpSpPr>
+      <p:sp>
+        <p:nvSpPr>
+          <p:cNvPr id="2" name="object 2"/>
+          <p:cNvSpPr/>
+          <p:nvPr/>
+        </p:nvSpPr>
+        <p:spPr>
+          <a:xfrm>
+            <a:off x="12291" y="24581"/>
+            <a:ext cx="12191999" cy="7118601"/>
+          </a:xfrm>
+          <a:prstGeom prst="rect">
+            <a:avLst/>
+          </a:prstGeom>
+          <a:blipFill>
+            <a:blip r:embed="rId2" cstate="print"/>
+            <a:stretch>
+              <a:fillRect/>
+            </a:stretch>
+          </a:blipFill>
+        </p:spPr>
+        <p:txBody>
+          <a:bodyPr wrap="square" lIns="0" tIns="0" rIns="0" bIns="0" rtlCol="0"/>
+          <a:lstStyle/>
+          <a:p>
+            <a:endParaRPr b="1" dirty="0">
+              <a:ln w="13462">
+                <a:solidFill>
+                  <a:schemeClr val="bg1"/>
+                </a:solidFill>
+                <a:prstDash val="solid"/>
+              </a:ln>
+              <a:solidFill>
+                <a:schemeClr val="tx1">
+                  <a:lumMod val="85000"/>
+                  <a:lumOff val="15000"/>
+                </a:schemeClr>
+              </a:solidFill>
+              <a:effectLst>
+                <a:outerShdw dist="38100" dir="2700000" algn="bl" rotWithShape="0">
+                  <a:schemeClr val="accent5"/>
+                </a:outerShdw>
+              </a:effectLst>
+            </a:endParaRPr>
+          </a:p>
+        </p:txBody>
+      </p:sp>
+      <p:sp>
+        <p:nvSpPr>
+          <p:cNvPr id="3" name="object 3"/>
+          <p:cNvSpPr txBox="1">
+            <a:spLocks noGrp="1"/>
+          </p:cNvSpPr>
+          <p:nvPr>
+            <p:ph type="title"/>
+          </p:nvPr>
+        </p:nvSpPr>
+        <p:spPr>
+          <a:xfrm>
+            <a:off x="938885" y="533400"/>
+            <a:ext cx="4471315" cy="535403"/>
+          </a:xfrm>
+          <a:prstGeom prst="rect">
+            <a:avLst/>
+          </a:prstGeom>
+        </p:spPr>
+        <p:txBody>
+          <a:bodyPr vert="horz" wrap="square" lIns="0" tIns="12065" rIns="0" bIns="0" rtlCol="0">
+            <a:spAutoFit/>
+          </a:bodyPr>
+          <a:lstStyle/>
+          <a:p>
+            <a:pPr marL="12700">
+              <a:lnSpc>
+                <a:spcPct val="100000"/>
+              </a:lnSpc>
+              <a:spcBef>
+                <a:spcPts val="95"/>
+              </a:spcBef>
+            </a:pPr>
+            <a:r>
+              <a:rPr lang="en-US" sz="3400" dirty="0">
+                <a:latin typeface="Carlito"/>
+                <a:cs typeface="Carlito"/>
+              </a:rPr>
+              <a:t>Transition</a:t>
+            </a:r>
+            <a:endParaRPr sz="3400" dirty="0">
+              <a:latin typeface="Carlito"/>
+              <a:cs typeface="Carlito"/>
+            </a:endParaRPr>
+          </a:p>
+        </p:txBody>
+      </p:sp>
+      <p:sp>
+        <p:nvSpPr>
+          <p:cNvPr id="5" name="object 5"/>
+          <p:cNvSpPr/>
+          <p:nvPr/>
+        </p:nvSpPr>
+        <p:spPr>
+          <a:xfrm>
+            <a:off x="9816083" y="262127"/>
+            <a:ext cx="1976627" cy="822960"/>
+          </a:xfrm>
+          <a:prstGeom prst="rect">
+            <a:avLst/>
+          </a:prstGeom>
+          <a:blipFill>
+            <a:blip r:embed="rId3" cstate="print"/>
+            <a:stretch>
+              <a:fillRect/>
+            </a:stretch>
+          </a:blipFill>
+        </p:spPr>
+        <p:txBody>
+          <a:bodyPr wrap="square" lIns="0" tIns="0" rIns="0" bIns="0" rtlCol="0"/>
+          <a:lstStyle/>
+          <a:p>
+            <a:endParaRPr/>
+          </a:p>
+        </p:txBody>
+      </p:sp>
+      <p:sp>
+        <p:nvSpPr>
+          <p:cNvPr id="7" name="TextBox 6">
+            <a:extLst>
+              <a:ext uri="{FF2B5EF4-FFF2-40B4-BE49-F238E27FC236}">
+                <a16:creationId xmlns:a16="http://schemas.microsoft.com/office/drawing/2014/main" id="{C2428796-F632-00B4-E484-CA738D260150}"/>
+              </a:ext>
+            </a:extLst>
+          </p:cNvPr>
+          <p:cNvSpPr txBox="1"/>
+          <p:nvPr/>
+        </p:nvSpPr>
+        <p:spPr>
+          <a:xfrm>
+            <a:off x="762000" y="1219200"/>
+            <a:ext cx="11582400" cy="5016758"/>
+          </a:xfrm>
+          <a:prstGeom prst="rect">
+            <a:avLst/>
+          </a:prstGeom>
+          <a:noFill/>
+        </p:spPr>
+        <p:txBody>
+          <a:bodyPr wrap="square" rtlCol="0">
+            <a:spAutoFit/>
+          </a:bodyPr>
+          <a:lstStyle/>
+          <a:p>
+            <a:r>
+              <a:rPr lang="en-US" sz="3200" dirty="0">
+                <a:solidFill>
+                  <a:schemeClr val="bg1"/>
+                </a:solidFill>
+                <a:latin typeface="+mj-lt"/>
+                <a:sym typeface="Wingdings" panose="05000000000000000000" pitchFamily="2" charset="2"/>
+              </a:rPr>
+              <a:t>Using hover we get abrupt transition. To avoid it we use:</a:t>
+            </a:r>
+          </a:p>
+          <a:p>
+            <a:endParaRPr lang="en-US" sz="3200" dirty="0">
+              <a:solidFill>
+                <a:schemeClr val="bg1"/>
+              </a:solidFill>
+              <a:latin typeface="+mj-lt"/>
+              <a:sym typeface="Wingdings" panose="05000000000000000000" pitchFamily="2" charset="2"/>
+            </a:endParaRPr>
+          </a:p>
+          <a:p>
+            <a:r>
+              <a:rPr lang="en-US" sz="3200" dirty="0">
+                <a:solidFill>
+                  <a:schemeClr val="bg1"/>
+                </a:solidFill>
+                <a:latin typeface="+mj-lt"/>
+                <a:sym typeface="Wingdings" panose="05000000000000000000" pitchFamily="2" charset="2"/>
+              </a:rPr>
+              <a:t>1.transition:2s (shorthand) </a:t>
+            </a:r>
+          </a:p>
+          <a:p>
+            <a:r>
+              <a:rPr lang="en-US" sz="3200" dirty="0">
+                <a:solidFill>
+                  <a:schemeClr val="bg1"/>
+                </a:solidFill>
+                <a:latin typeface="+mj-lt"/>
+                <a:sym typeface="Wingdings" panose="05000000000000000000" pitchFamily="2" charset="2"/>
+              </a:rPr>
+              <a:t>2.transition-duration: 2s (duration of animation)</a:t>
+            </a:r>
+          </a:p>
+          <a:p>
+            <a:r>
+              <a:rPr lang="en-US" sz="3200" dirty="0">
+                <a:solidFill>
+                  <a:schemeClr val="bg1"/>
+                </a:solidFill>
+                <a:latin typeface="+mj-lt"/>
+                <a:sym typeface="Wingdings" panose="05000000000000000000" pitchFamily="2" charset="2"/>
+              </a:rPr>
+              <a:t>3.transition-delay: 2s (duration before animation)</a:t>
+            </a:r>
+          </a:p>
+          <a:p>
+            <a:endParaRPr lang="en-US" sz="3200" dirty="0">
+              <a:solidFill>
+                <a:schemeClr val="bg1"/>
+              </a:solidFill>
+              <a:latin typeface="+mj-lt"/>
+              <a:sym typeface="Wingdings" panose="05000000000000000000" pitchFamily="2" charset="2"/>
+            </a:endParaRPr>
+          </a:p>
+          <a:p>
+            <a:r>
+              <a:rPr lang="en-US" sz="3200" dirty="0">
+                <a:solidFill>
+                  <a:schemeClr val="bg1"/>
+                </a:solidFill>
+                <a:latin typeface="+mj-lt"/>
+                <a:sym typeface="Wingdings" panose="05000000000000000000" pitchFamily="2" charset="2"/>
+              </a:rPr>
+              <a:t>Specifying transition in only one property</a:t>
+            </a:r>
+          </a:p>
+          <a:p>
+            <a:r>
+              <a:rPr lang="en-US" sz="3200" dirty="0">
+                <a:solidFill>
+                  <a:schemeClr val="bg1"/>
+                </a:solidFill>
+                <a:latin typeface="+mj-lt"/>
+                <a:sym typeface="Wingdings" panose="05000000000000000000" pitchFamily="2" charset="2"/>
+              </a:rPr>
+              <a:t>4.transition-property: border-radius</a:t>
+            </a:r>
+          </a:p>
+          <a:p>
+            <a:r>
+              <a:rPr lang="en-US" sz="3200" dirty="0">
+                <a:solidFill>
+                  <a:schemeClr val="bg1"/>
+                </a:solidFill>
+                <a:latin typeface="+mj-lt"/>
+                <a:sym typeface="Wingdings" panose="05000000000000000000" pitchFamily="2" charset="2"/>
+              </a:rPr>
+              <a:t>5.transition-timing-function: ease-in, ease-out, ease-in-out, linear</a:t>
+            </a:r>
+          </a:p>
+          <a:p>
+            <a:r>
+              <a:rPr lang="en-US" sz="3200" dirty="0">
+                <a:solidFill>
+                  <a:schemeClr val="bg1"/>
+                </a:solidFill>
+                <a:latin typeface="+mj-lt"/>
+                <a:sym typeface="Wingdings" panose="05000000000000000000" pitchFamily="2" charset="2"/>
+              </a:rPr>
+              <a:t>(tip: try using width instead of margin)</a:t>
+            </a:r>
+          </a:p>
+        </p:txBody>
+      </p:sp>
+    </p:spTree>
+    <p:extLst>
+      <p:ext uri="{BB962C8B-B14F-4D97-AF65-F5344CB8AC3E}">
+        <p14:creationId xmlns:p14="http://schemas.microsoft.com/office/powerpoint/2010/main" val="1466464914"/>
+      </p:ext>
+    </p:extLst>
+  </p:cSld>
+  <p:clrMapOvr>
+    <a:masterClrMapping/>
+  </p:clrMapOvr>
+</p:sld>
+</file>
+
+<file path=ppt/slides/slide39.xml><?xml version="1.0" encoding="utf-8"?>
+<p:sld xmlns:a="http://schemas.openxmlformats.org/drawingml/2006/main" xmlns:r="http://schemas.openxmlformats.org/officeDocument/2006/relationships" xmlns:p="http://schemas.openxmlformats.org/presentationml/2006/main">
+  <p:cSld>
+    <p:spTree>
+      <p:nvGrpSpPr>
+        <p:cNvPr id="1" name=""/>
+        <p:cNvGrpSpPr/>
+        <p:nvPr/>
+      </p:nvGrpSpPr>
+      <p:grpSpPr>
+        <a:xfrm>
+          <a:off x="0" y="0"/>
+          <a:ext cx="0" cy="0"/>
+          <a:chOff x="0" y="0"/>
+          <a:chExt cx="0" cy="0"/>
+        </a:xfrm>
+      </p:grpSpPr>
+      <p:sp>
+        <p:nvSpPr>
+          <p:cNvPr id="2" name="object 2"/>
+          <p:cNvSpPr/>
+          <p:nvPr/>
+        </p:nvSpPr>
+        <p:spPr>
+          <a:xfrm>
+            <a:off x="12291" y="24581"/>
+            <a:ext cx="12191999" cy="7118601"/>
+          </a:xfrm>
+          <a:prstGeom prst="rect">
+            <a:avLst/>
+          </a:prstGeom>
+          <a:blipFill>
+            <a:blip r:embed="rId2" cstate="print"/>
+            <a:stretch>
+              <a:fillRect/>
+            </a:stretch>
+          </a:blipFill>
+        </p:spPr>
+        <p:txBody>
+          <a:bodyPr wrap="square" lIns="0" tIns="0" rIns="0" bIns="0" rtlCol="0"/>
+          <a:lstStyle/>
+          <a:p>
+            <a:endParaRPr b="1" dirty="0">
+              <a:ln w="13462">
+                <a:solidFill>
+                  <a:schemeClr val="bg1"/>
+                </a:solidFill>
+                <a:prstDash val="solid"/>
+              </a:ln>
+              <a:solidFill>
+                <a:schemeClr val="tx1">
+                  <a:lumMod val="85000"/>
+                  <a:lumOff val="15000"/>
+                </a:schemeClr>
+              </a:solidFill>
+              <a:effectLst>
+                <a:outerShdw dist="38100" dir="2700000" algn="bl" rotWithShape="0">
+                  <a:schemeClr val="accent5"/>
+                </a:outerShdw>
+              </a:effectLst>
+            </a:endParaRPr>
+          </a:p>
+        </p:txBody>
+      </p:sp>
+      <p:sp>
+        <p:nvSpPr>
+          <p:cNvPr id="3" name="object 3"/>
+          <p:cNvSpPr txBox="1">
+            <a:spLocks noGrp="1"/>
+          </p:cNvSpPr>
+          <p:nvPr>
+            <p:ph type="title"/>
+          </p:nvPr>
+        </p:nvSpPr>
+        <p:spPr>
+          <a:xfrm>
+            <a:off x="609600" y="533400"/>
+            <a:ext cx="4471315" cy="535403"/>
+          </a:xfrm>
+          <a:prstGeom prst="rect">
+            <a:avLst/>
+          </a:prstGeom>
+        </p:spPr>
+        <p:txBody>
+          <a:bodyPr vert="horz" wrap="square" lIns="0" tIns="12065" rIns="0" bIns="0" rtlCol="0">
+            <a:spAutoFit/>
+          </a:bodyPr>
+          <a:lstStyle/>
+          <a:p>
+            <a:pPr marL="12700">
+              <a:lnSpc>
+                <a:spcPct val="100000"/>
+              </a:lnSpc>
+              <a:spcBef>
+                <a:spcPts val="95"/>
+              </a:spcBef>
+            </a:pPr>
+            <a:r>
+              <a:rPr lang="en-US" sz="3400" dirty="0">
+                <a:latin typeface="Carlito"/>
+                <a:cs typeface="Carlito"/>
+              </a:rPr>
+              <a:t>Grid</a:t>
+            </a:r>
+            <a:endParaRPr sz="3400" dirty="0">
+              <a:latin typeface="Carlito"/>
+              <a:cs typeface="Carlito"/>
+            </a:endParaRPr>
+          </a:p>
+        </p:txBody>
+      </p:sp>
+      <p:sp>
+        <p:nvSpPr>
+          <p:cNvPr id="5" name="object 5"/>
+          <p:cNvSpPr/>
+          <p:nvPr/>
+        </p:nvSpPr>
+        <p:spPr>
+          <a:xfrm>
+            <a:off x="9816083" y="262127"/>
+            <a:ext cx="1976627" cy="822960"/>
+          </a:xfrm>
+          <a:prstGeom prst="rect">
+            <a:avLst/>
+          </a:prstGeom>
+          <a:blipFill>
+            <a:blip r:embed="rId3" cstate="print"/>
+            <a:stretch>
+              <a:fillRect/>
+            </a:stretch>
+          </a:blipFill>
+        </p:spPr>
+        <p:txBody>
+          <a:bodyPr wrap="square" lIns="0" tIns="0" rIns="0" bIns="0" rtlCol="0"/>
+          <a:lstStyle/>
+          <a:p>
+            <a:endParaRPr/>
+          </a:p>
+        </p:txBody>
+      </p:sp>
+      <p:sp>
+        <p:nvSpPr>
+          <p:cNvPr id="7" name="TextBox 6">
+            <a:extLst>
+              <a:ext uri="{FF2B5EF4-FFF2-40B4-BE49-F238E27FC236}">
+                <a16:creationId xmlns:a16="http://schemas.microsoft.com/office/drawing/2014/main" id="{C2428796-F632-00B4-E484-CA738D260150}"/>
+              </a:ext>
+            </a:extLst>
+          </p:cNvPr>
+          <p:cNvSpPr txBox="1"/>
+          <p:nvPr/>
+        </p:nvSpPr>
+        <p:spPr>
+          <a:xfrm>
+            <a:off x="533400" y="1066800"/>
+            <a:ext cx="11417709" cy="6001643"/>
+          </a:xfrm>
+          <a:prstGeom prst="rect">
+            <a:avLst/>
+          </a:prstGeom>
+          <a:noFill/>
+        </p:spPr>
+        <p:txBody>
+          <a:bodyPr wrap="square" rtlCol="0">
+            <a:spAutoFit/>
+          </a:bodyPr>
+          <a:lstStyle/>
+          <a:p>
+            <a:r>
+              <a:rPr lang="en-US" sz="3200" dirty="0">
+                <a:solidFill>
+                  <a:schemeClr val="bg1"/>
+                </a:solidFill>
+              </a:rPr>
+              <a:t>Grid is the very first CSS module created specifically to solve the layout problems.</a:t>
+            </a:r>
+            <a:endParaRPr lang="en-US" sz="3200" dirty="0">
+              <a:solidFill>
+                <a:schemeClr val="bg1"/>
+              </a:solidFill>
+              <a:sym typeface="Wingdings" panose="05000000000000000000" pitchFamily="2" charset="2"/>
+            </a:endParaRPr>
+          </a:p>
+          <a:p>
+            <a:endParaRPr lang="en-US" sz="3200" dirty="0">
+              <a:solidFill>
+                <a:schemeClr val="bg1"/>
+              </a:solidFill>
+              <a:latin typeface="+mj-lt"/>
+              <a:sym typeface="Wingdings" panose="05000000000000000000" pitchFamily="2" charset="2"/>
+            </a:endParaRPr>
+          </a:p>
+          <a:p>
+            <a:r>
+              <a:rPr lang="en-US" sz="3200" dirty="0">
+                <a:solidFill>
+                  <a:schemeClr val="bg1"/>
+                </a:solidFill>
+              </a:rPr>
+              <a:t>Grid Container : Parent’s Properties </a:t>
+            </a:r>
+          </a:p>
+          <a:p>
+            <a:r>
+              <a:rPr lang="en-US" sz="3200" dirty="0">
+                <a:solidFill>
+                  <a:schemeClr val="bg1"/>
+                </a:solidFill>
+              </a:rPr>
+              <a:t>Grid Items : Children’s Properties</a:t>
+            </a:r>
+          </a:p>
+          <a:p>
+            <a:r>
+              <a:rPr lang="en-US" sz="3200" dirty="0">
+                <a:solidFill>
+                  <a:schemeClr val="bg1"/>
+                </a:solidFill>
+                <a:latin typeface="+mj-lt"/>
+                <a:sym typeface="Wingdings" panose="05000000000000000000" pitchFamily="2" charset="2"/>
+              </a:rPr>
+              <a:t>(grid can be </a:t>
+            </a:r>
+            <a:r>
+              <a:rPr lang="en-US" sz="3200" dirty="0" err="1">
+                <a:solidFill>
+                  <a:schemeClr val="bg1"/>
+                </a:solidFill>
+                <a:latin typeface="+mj-lt"/>
+                <a:sym typeface="Wingdings" panose="05000000000000000000" pitchFamily="2" charset="2"/>
+              </a:rPr>
+              <a:t>overided</a:t>
+            </a:r>
+            <a:r>
+              <a:rPr lang="en-US" sz="3200" dirty="0">
+                <a:solidFill>
+                  <a:schemeClr val="bg1"/>
+                </a:solidFill>
+                <a:latin typeface="+mj-lt"/>
+                <a:sym typeface="Wingdings" panose="05000000000000000000" pitchFamily="2" charset="2"/>
+              </a:rPr>
+              <a:t> with ease)</a:t>
+            </a:r>
+          </a:p>
+          <a:p>
+            <a:endParaRPr lang="en-US" sz="3200" dirty="0">
+              <a:solidFill>
+                <a:schemeClr val="bg1"/>
+              </a:solidFill>
+              <a:latin typeface="+mj-lt"/>
+              <a:sym typeface="Wingdings" panose="05000000000000000000" pitchFamily="2" charset="2"/>
+            </a:endParaRPr>
+          </a:p>
+          <a:p>
+            <a:r>
+              <a:rPr lang="en-US" sz="3200" dirty="0">
+                <a:solidFill>
+                  <a:schemeClr val="bg1"/>
+                </a:solidFill>
+                <a:latin typeface="+mj-lt"/>
+                <a:sym typeface="Wingdings" panose="05000000000000000000" pitchFamily="2" charset="2"/>
+              </a:rPr>
+              <a:t>display: grid;</a:t>
+            </a:r>
+          </a:p>
+          <a:p>
+            <a:r>
+              <a:rPr lang="en-US" sz="3200" dirty="0">
+                <a:solidFill>
+                  <a:schemeClr val="bg1"/>
+                </a:solidFill>
+                <a:latin typeface="+mj-lt"/>
+                <a:sym typeface="Wingdings" panose="05000000000000000000" pitchFamily="2" charset="2"/>
+              </a:rPr>
+              <a:t>grid-template-columns: 100px 200px;(set size by columns) </a:t>
+            </a:r>
+          </a:p>
+          <a:p>
+            <a:r>
+              <a:rPr lang="en-US" sz="3200" dirty="0">
+                <a:solidFill>
+                  <a:schemeClr val="bg1"/>
+                </a:solidFill>
+                <a:latin typeface="+mj-lt"/>
+                <a:sym typeface="Wingdings" panose="05000000000000000000" pitchFamily="2" charset="2"/>
+              </a:rPr>
+              <a:t>grid-template-rows: 50px 100px 150px; (set size by rows)</a:t>
+            </a:r>
+          </a:p>
+          <a:p>
+            <a:r>
+              <a:rPr lang="en-US" sz="3200" dirty="0">
+                <a:solidFill>
+                  <a:schemeClr val="bg1"/>
+                </a:solidFill>
+                <a:latin typeface="+mj-lt"/>
+                <a:sym typeface="Wingdings" panose="05000000000000000000" pitchFamily="2" charset="2"/>
+              </a:rPr>
+              <a:t>grid-auto-rows: 50px ; (unspecified items will take only this size)</a:t>
+            </a:r>
+          </a:p>
+          <a:p>
+            <a:r>
+              <a:rPr lang="en-US" sz="3200" dirty="0">
+                <a:solidFill>
+                  <a:schemeClr val="bg1"/>
+                </a:solidFill>
+                <a:latin typeface="+mj-lt"/>
+                <a:sym typeface="Wingdings" panose="05000000000000000000" pitchFamily="2" charset="2"/>
+              </a:rPr>
+              <a:t>grid-auto-flow : column;</a:t>
+            </a:r>
+          </a:p>
+        </p:txBody>
+      </p:sp>
+      <p:pic>
+        <p:nvPicPr>
+          <p:cNvPr id="6" name="Picture 5">
+            <a:extLst>
+              <a:ext uri="{FF2B5EF4-FFF2-40B4-BE49-F238E27FC236}">
+                <a16:creationId xmlns:a16="http://schemas.microsoft.com/office/drawing/2014/main" id="{D97B5F12-22FD-C983-588C-F9BBAA3FFBA9}"/>
+              </a:ext>
+            </a:extLst>
+          </p:cNvPr>
+          <p:cNvPicPr>
+            <a:picLocks noChangeAspect="1"/>
+          </p:cNvPicPr>
+          <p:nvPr/>
+        </p:nvPicPr>
+        <p:blipFill>
+          <a:blip r:embed="rId4"/>
+          <a:stretch>
+            <a:fillRect/>
+          </a:stretch>
+        </p:blipFill>
+        <p:spPr>
+          <a:xfrm>
+            <a:off x="6629400" y="2157843"/>
+            <a:ext cx="5191595" cy="2154586"/>
+          </a:xfrm>
+          <a:prstGeom prst="rect">
+            <a:avLst/>
+          </a:prstGeom>
+        </p:spPr>
+      </p:pic>
+    </p:spTree>
+    <p:extLst>
+      <p:ext uri="{BB962C8B-B14F-4D97-AF65-F5344CB8AC3E}">
+        <p14:creationId xmlns:p14="http://schemas.microsoft.com/office/powerpoint/2010/main" val="1011183482"/>
       </p:ext>
     </p:extLst>
   </p:cSld>
@@ -11031,6 +11717,3622 @@
     <p:extLst>
       <p:ext uri="{BB962C8B-B14F-4D97-AF65-F5344CB8AC3E}">
         <p14:creationId xmlns:p14="http://schemas.microsoft.com/office/powerpoint/2010/main" val="483950899"/>
+      </p:ext>
+    </p:extLst>
+  </p:cSld>
+  <p:clrMapOvr>
+    <a:masterClrMapping/>
+  </p:clrMapOvr>
+</p:sld>
+</file>
+
+<file path=ppt/slides/slide40.xml><?xml version="1.0" encoding="utf-8"?>
+<p:sld xmlns:a="http://schemas.openxmlformats.org/drawingml/2006/main" xmlns:r="http://schemas.openxmlformats.org/officeDocument/2006/relationships" xmlns:p="http://schemas.openxmlformats.org/presentationml/2006/main">
+  <p:cSld>
+    <p:spTree>
+      <p:nvGrpSpPr>
+        <p:cNvPr id="1" name=""/>
+        <p:cNvGrpSpPr/>
+        <p:nvPr/>
+      </p:nvGrpSpPr>
+      <p:grpSpPr>
+        <a:xfrm>
+          <a:off x="0" y="0"/>
+          <a:ext cx="0" cy="0"/>
+          <a:chOff x="0" y="0"/>
+          <a:chExt cx="0" cy="0"/>
+        </a:xfrm>
+      </p:grpSpPr>
+      <p:sp>
+        <p:nvSpPr>
+          <p:cNvPr id="2" name="object 2"/>
+          <p:cNvSpPr/>
+          <p:nvPr/>
+        </p:nvSpPr>
+        <p:spPr>
+          <a:xfrm>
+            <a:off x="1" y="24581"/>
+            <a:ext cx="12191999" cy="7118601"/>
+          </a:xfrm>
+          <a:prstGeom prst="rect">
+            <a:avLst/>
+          </a:prstGeom>
+          <a:blipFill>
+            <a:blip r:embed="rId2" cstate="print"/>
+            <a:stretch>
+              <a:fillRect/>
+            </a:stretch>
+          </a:blipFill>
+        </p:spPr>
+        <p:txBody>
+          <a:bodyPr wrap="square" lIns="0" tIns="0" rIns="0" bIns="0" rtlCol="0"/>
+          <a:lstStyle/>
+          <a:p>
+            <a:endParaRPr b="1" dirty="0">
+              <a:ln w="13462">
+                <a:solidFill>
+                  <a:schemeClr val="bg1"/>
+                </a:solidFill>
+                <a:prstDash val="solid"/>
+              </a:ln>
+              <a:solidFill>
+                <a:schemeClr val="tx1">
+                  <a:lumMod val="85000"/>
+                  <a:lumOff val="15000"/>
+                </a:schemeClr>
+              </a:solidFill>
+              <a:effectLst>
+                <a:outerShdw dist="38100" dir="2700000" algn="bl" rotWithShape="0">
+                  <a:schemeClr val="accent5"/>
+                </a:outerShdw>
+              </a:effectLst>
+            </a:endParaRPr>
+          </a:p>
+        </p:txBody>
+      </p:sp>
+      <p:sp>
+        <p:nvSpPr>
+          <p:cNvPr id="3" name="object 3"/>
+          <p:cNvSpPr txBox="1">
+            <a:spLocks noGrp="1"/>
+          </p:cNvSpPr>
+          <p:nvPr>
+            <p:ph type="title"/>
+          </p:nvPr>
+        </p:nvSpPr>
+        <p:spPr>
+          <a:xfrm>
+            <a:off x="609600" y="533400"/>
+            <a:ext cx="4471315" cy="535403"/>
+          </a:xfrm>
+          <a:prstGeom prst="rect">
+            <a:avLst/>
+          </a:prstGeom>
+        </p:spPr>
+        <p:txBody>
+          <a:bodyPr vert="horz" wrap="square" lIns="0" tIns="12065" rIns="0" bIns="0" rtlCol="0">
+            <a:spAutoFit/>
+          </a:bodyPr>
+          <a:lstStyle/>
+          <a:p>
+            <a:pPr marL="12700">
+              <a:lnSpc>
+                <a:spcPct val="100000"/>
+              </a:lnSpc>
+              <a:spcBef>
+                <a:spcPts val="95"/>
+              </a:spcBef>
+            </a:pPr>
+            <a:r>
+              <a:rPr lang="en-US" sz="3400" u="sng" dirty="0">
+                <a:latin typeface="Carlito"/>
+                <a:cs typeface="Carlito"/>
+              </a:rPr>
+              <a:t>Grid Properties</a:t>
+            </a:r>
+            <a:endParaRPr sz="3400" u="sng" dirty="0">
+              <a:latin typeface="Carlito"/>
+              <a:cs typeface="Carlito"/>
+            </a:endParaRPr>
+          </a:p>
+        </p:txBody>
+      </p:sp>
+      <p:sp>
+        <p:nvSpPr>
+          <p:cNvPr id="5" name="object 5"/>
+          <p:cNvSpPr/>
+          <p:nvPr/>
+        </p:nvSpPr>
+        <p:spPr>
+          <a:xfrm>
+            <a:off x="9816083" y="262127"/>
+            <a:ext cx="1976627" cy="822960"/>
+          </a:xfrm>
+          <a:prstGeom prst="rect">
+            <a:avLst/>
+          </a:prstGeom>
+          <a:blipFill>
+            <a:blip r:embed="rId3" cstate="print"/>
+            <a:stretch>
+              <a:fillRect/>
+            </a:stretch>
+          </a:blipFill>
+        </p:spPr>
+        <p:txBody>
+          <a:bodyPr wrap="square" lIns="0" tIns="0" rIns="0" bIns="0" rtlCol="0"/>
+          <a:lstStyle/>
+          <a:p>
+            <a:endParaRPr/>
+          </a:p>
+        </p:txBody>
+      </p:sp>
+      <p:sp>
+        <p:nvSpPr>
+          <p:cNvPr id="7" name="TextBox 6">
+            <a:extLst>
+              <a:ext uri="{FF2B5EF4-FFF2-40B4-BE49-F238E27FC236}">
+                <a16:creationId xmlns:a16="http://schemas.microsoft.com/office/drawing/2014/main" id="{C2428796-F632-00B4-E484-CA738D260150}"/>
+              </a:ext>
+            </a:extLst>
+          </p:cNvPr>
+          <p:cNvSpPr txBox="1"/>
+          <p:nvPr/>
+        </p:nvSpPr>
+        <p:spPr>
+          <a:xfrm>
+            <a:off x="533400" y="1114485"/>
+            <a:ext cx="11811000" cy="6001643"/>
+          </a:xfrm>
+          <a:prstGeom prst="rect">
+            <a:avLst/>
+          </a:prstGeom>
+          <a:noFill/>
+        </p:spPr>
+        <p:txBody>
+          <a:bodyPr wrap="square" rtlCol="0">
+            <a:spAutoFit/>
+          </a:bodyPr>
+          <a:lstStyle/>
+          <a:p>
+            <a:r>
+              <a:rPr lang="en-US" sz="3200" dirty="0">
+                <a:solidFill>
+                  <a:schemeClr val="bg1"/>
+                </a:solidFill>
+                <a:latin typeface="+mj-lt"/>
+                <a:sym typeface="Wingdings" panose="05000000000000000000" pitchFamily="2" charset="2"/>
+              </a:rPr>
+              <a:t>1.display: grid;</a:t>
+            </a:r>
+          </a:p>
+          <a:p>
+            <a:r>
+              <a:rPr lang="en-US" sz="3200" dirty="0">
+                <a:solidFill>
+                  <a:schemeClr val="bg1"/>
+                </a:solidFill>
+                <a:latin typeface="+mj-lt"/>
+                <a:sym typeface="Wingdings" panose="05000000000000000000" pitchFamily="2" charset="2"/>
+              </a:rPr>
+              <a:t>2.grid-template-columns: 100px 200px;(set size by columns) </a:t>
+            </a:r>
+          </a:p>
+          <a:p>
+            <a:r>
+              <a:rPr lang="en-US" sz="3200" dirty="0">
+                <a:solidFill>
+                  <a:schemeClr val="bg1"/>
+                </a:solidFill>
+                <a:latin typeface="+mj-lt"/>
+                <a:sym typeface="Wingdings" panose="05000000000000000000" pitchFamily="2" charset="2"/>
+              </a:rPr>
+              <a:t>3.grid-template-rows: 50px 100px 150px; (set size by rows)</a:t>
+            </a:r>
+          </a:p>
+          <a:p>
+            <a:r>
+              <a:rPr lang="en-US" sz="3200" dirty="0">
+                <a:solidFill>
+                  <a:schemeClr val="bg1"/>
+                </a:solidFill>
+                <a:latin typeface="+mj-lt"/>
+                <a:sym typeface="Wingdings" panose="05000000000000000000" pitchFamily="2" charset="2"/>
+              </a:rPr>
+              <a:t>4.grid-auto-rows: 50px ; (unspecified items will take only this size)</a:t>
+            </a:r>
+          </a:p>
+          <a:p>
+            <a:r>
+              <a:rPr lang="en-US" sz="3200" dirty="0">
+                <a:solidFill>
+                  <a:schemeClr val="bg1"/>
+                </a:solidFill>
+                <a:latin typeface="+mj-lt"/>
+                <a:sym typeface="Wingdings" panose="05000000000000000000" pitchFamily="2" charset="2"/>
+              </a:rPr>
+              <a:t>5.grid-auto-flow : column; (where to put unset items (default: row))</a:t>
+            </a:r>
+          </a:p>
+          <a:p>
+            <a:r>
+              <a:rPr lang="en-US" sz="3200" dirty="0">
+                <a:solidFill>
+                  <a:schemeClr val="bg1"/>
+                </a:solidFill>
+                <a:latin typeface="+mj-lt"/>
+                <a:sym typeface="Wingdings" panose="05000000000000000000" pitchFamily="2" charset="2"/>
+              </a:rPr>
+              <a:t>6.grid-auto-columns: 50px ; (unspecified items will take only this size in columns)</a:t>
+            </a:r>
+          </a:p>
+          <a:p>
+            <a:endParaRPr lang="en-US" sz="3200" dirty="0">
+              <a:solidFill>
+                <a:schemeClr val="bg1"/>
+              </a:solidFill>
+              <a:latin typeface="+mj-lt"/>
+              <a:sym typeface="Wingdings" panose="05000000000000000000" pitchFamily="2" charset="2"/>
+            </a:endParaRPr>
+          </a:p>
+          <a:p>
+            <a:r>
+              <a:rPr lang="en-US" sz="3200" u="sng" dirty="0">
+                <a:solidFill>
+                  <a:schemeClr val="bg1"/>
+                </a:solidFill>
+                <a:latin typeface="+mj-lt"/>
+                <a:sym typeface="Wingdings" panose="05000000000000000000" pitchFamily="2" charset="2"/>
+              </a:rPr>
+              <a:t>Span Properties</a:t>
+            </a:r>
+          </a:p>
+          <a:p>
+            <a:pPr marL="514350" indent="-514350">
+              <a:buAutoNum type="arabicPeriod"/>
+            </a:pPr>
+            <a:r>
+              <a:rPr lang="en-US" sz="3200" dirty="0">
+                <a:solidFill>
+                  <a:schemeClr val="bg1"/>
+                </a:solidFill>
+                <a:latin typeface="+mj-lt"/>
+                <a:sym typeface="Wingdings" panose="05000000000000000000" pitchFamily="2" charset="2"/>
+              </a:rPr>
+              <a:t>grid-column: span 2; grid-row: span 2;</a:t>
+            </a:r>
+          </a:p>
+          <a:p>
+            <a:pPr marL="514350" indent="-514350">
+              <a:buAutoNum type="arabicPeriod"/>
+            </a:pPr>
+            <a:r>
+              <a:rPr lang="en-US" sz="3200" dirty="0">
+                <a:solidFill>
+                  <a:schemeClr val="bg1"/>
+                </a:solidFill>
+                <a:latin typeface="+mj-lt"/>
+                <a:sym typeface="Wingdings" panose="05000000000000000000" pitchFamily="2" charset="2"/>
+              </a:rPr>
+              <a:t>grid-column-start:2;  grid-column-end:3;</a:t>
+            </a:r>
+          </a:p>
+          <a:p>
+            <a:pPr marL="514350" indent="-514350">
+              <a:buAutoNum type="arabicPeriod"/>
+            </a:pPr>
+            <a:r>
+              <a:rPr lang="en-US" sz="3200" dirty="0">
+                <a:solidFill>
+                  <a:schemeClr val="bg1"/>
+                </a:solidFill>
+                <a:latin typeface="+mj-lt"/>
+                <a:sym typeface="Wingdings" panose="05000000000000000000" pitchFamily="2" charset="2"/>
+              </a:rPr>
+              <a:t>grid-row-start:2;  grid-row-end:3;  (explore more ways </a:t>
+            </a:r>
+            <a:r>
+              <a:rPr lang="en-US" sz="3200" dirty="0" err="1">
+                <a:solidFill>
+                  <a:schemeClr val="bg1"/>
+                </a:solidFill>
+                <a:latin typeface="+mj-lt"/>
+                <a:sym typeface="Wingdings" panose="05000000000000000000" pitchFamily="2" charset="2"/>
+              </a:rPr>
+              <a:t>mdn</a:t>
+            </a:r>
+            <a:r>
+              <a:rPr lang="en-US" sz="3200" dirty="0">
+                <a:solidFill>
+                  <a:schemeClr val="bg1"/>
+                </a:solidFill>
+                <a:latin typeface="+mj-lt"/>
+                <a:sym typeface="Wingdings" panose="05000000000000000000" pitchFamily="2" charset="2"/>
+              </a:rPr>
+              <a:t>/w3 se)</a:t>
+            </a:r>
+          </a:p>
+        </p:txBody>
+      </p:sp>
+    </p:spTree>
+    <p:extLst>
+      <p:ext uri="{BB962C8B-B14F-4D97-AF65-F5344CB8AC3E}">
+        <p14:creationId xmlns:p14="http://schemas.microsoft.com/office/powerpoint/2010/main" val="1712111644"/>
+      </p:ext>
+    </p:extLst>
+  </p:cSld>
+  <p:clrMapOvr>
+    <a:masterClrMapping/>
+  </p:clrMapOvr>
+</p:sld>
+</file>
+
+<file path=ppt/slides/slide41.xml><?xml version="1.0" encoding="utf-8"?>
+<p:sld xmlns:a="http://schemas.openxmlformats.org/drawingml/2006/main" xmlns:r="http://schemas.openxmlformats.org/officeDocument/2006/relationships" xmlns:p="http://schemas.openxmlformats.org/presentationml/2006/main">
+  <p:cSld>
+    <p:spTree>
+      <p:nvGrpSpPr>
+        <p:cNvPr id="1" name=""/>
+        <p:cNvGrpSpPr/>
+        <p:nvPr/>
+      </p:nvGrpSpPr>
+      <p:grpSpPr>
+        <a:xfrm>
+          <a:off x="0" y="0"/>
+          <a:ext cx="0" cy="0"/>
+          <a:chOff x="0" y="0"/>
+          <a:chExt cx="0" cy="0"/>
+        </a:xfrm>
+      </p:grpSpPr>
+      <p:sp>
+        <p:nvSpPr>
+          <p:cNvPr id="2" name="object 2"/>
+          <p:cNvSpPr/>
+          <p:nvPr/>
+        </p:nvSpPr>
+        <p:spPr>
+          <a:xfrm>
+            <a:off x="1" y="24581"/>
+            <a:ext cx="12191999" cy="7118601"/>
+          </a:xfrm>
+          <a:prstGeom prst="rect">
+            <a:avLst/>
+          </a:prstGeom>
+          <a:blipFill>
+            <a:blip r:embed="rId2" cstate="print"/>
+            <a:stretch>
+              <a:fillRect/>
+            </a:stretch>
+          </a:blipFill>
+        </p:spPr>
+        <p:txBody>
+          <a:bodyPr wrap="square" lIns="0" tIns="0" rIns="0" bIns="0" rtlCol="0"/>
+          <a:lstStyle/>
+          <a:p>
+            <a:endParaRPr b="1" dirty="0">
+              <a:ln w="13462">
+                <a:solidFill>
+                  <a:schemeClr val="bg1"/>
+                </a:solidFill>
+                <a:prstDash val="solid"/>
+              </a:ln>
+              <a:solidFill>
+                <a:schemeClr val="tx1">
+                  <a:lumMod val="85000"/>
+                  <a:lumOff val="15000"/>
+                </a:schemeClr>
+              </a:solidFill>
+              <a:effectLst>
+                <a:outerShdw dist="38100" dir="2700000" algn="bl" rotWithShape="0">
+                  <a:schemeClr val="accent5"/>
+                </a:outerShdw>
+              </a:effectLst>
+            </a:endParaRPr>
+          </a:p>
+        </p:txBody>
+      </p:sp>
+      <p:sp>
+        <p:nvSpPr>
+          <p:cNvPr id="3" name="object 3"/>
+          <p:cNvSpPr txBox="1">
+            <a:spLocks noGrp="1"/>
+          </p:cNvSpPr>
+          <p:nvPr>
+            <p:ph type="title"/>
+          </p:nvPr>
+        </p:nvSpPr>
+        <p:spPr>
+          <a:xfrm>
+            <a:off x="609600" y="533400"/>
+            <a:ext cx="4471315" cy="535403"/>
+          </a:xfrm>
+          <a:prstGeom prst="rect">
+            <a:avLst/>
+          </a:prstGeom>
+        </p:spPr>
+        <p:txBody>
+          <a:bodyPr vert="horz" wrap="square" lIns="0" tIns="12065" rIns="0" bIns="0" rtlCol="0">
+            <a:spAutoFit/>
+          </a:bodyPr>
+          <a:lstStyle/>
+          <a:p>
+            <a:pPr marL="12700">
+              <a:lnSpc>
+                <a:spcPct val="100000"/>
+              </a:lnSpc>
+              <a:spcBef>
+                <a:spcPts val="95"/>
+              </a:spcBef>
+            </a:pPr>
+            <a:r>
+              <a:rPr lang="en-US" sz="3400" dirty="0">
+                <a:latin typeface="Carlito"/>
+                <a:cs typeface="Carlito"/>
+                <a:hlinkClick r:id="rId3"/>
+              </a:rPr>
+              <a:t>Grid Template Areas</a:t>
+            </a:r>
+            <a:r>
+              <a:rPr lang="en-US" sz="3400" dirty="0">
+                <a:latin typeface="Carlito"/>
+                <a:cs typeface="Carlito"/>
+              </a:rPr>
+              <a:t> </a:t>
+            </a:r>
+            <a:r>
+              <a:rPr lang="en-US" sz="2000" dirty="0">
+                <a:solidFill>
+                  <a:schemeClr val="tx2">
+                    <a:lumMod val="20000"/>
+                    <a:lumOff val="80000"/>
+                  </a:schemeClr>
+                </a:solidFill>
+                <a:latin typeface="Carlito"/>
+                <a:cs typeface="Carlito"/>
+                <a:hlinkClick r:id="rId3">
+                  <a:extLst>
+                    <a:ext uri="{A12FA001-AC4F-418D-AE19-62706E023703}">
+                      <ahyp:hlinkClr xmlns:ahyp="http://schemas.microsoft.com/office/drawing/2018/hyperlinkcolor" val="tx"/>
+                    </a:ext>
+                  </a:extLst>
+                </a:hlinkClick>
+              </a:rPr>
+              <a:t>link</a:t>
+            </a:r>
+            <a:endParaRPr sz="3400" dirty="0">
+              <a:solidFill>
+                <a:schemeClr val="tx2">
+                  <a:lumMod val="20000"/>
+                  <a:lumOff val="80000"/>
+                </a:schemeClr>
+              </a:solidFill>
+              <a:latin typeface="Carlito"/>
+              <a:cs typeface="Carlito"/>
+            </a:endParaRPr>
+          </a:p>
+        </p:txBody>
+      </p:sp>
+      <p:sp>
+        <p:nvSpPr>
+          <p:cNvPr id="5" name="object 5"/>
+          <p:cNvSpPr/>
+          <p:nvPr/>
+        </p:nvSpPr>
+        <p:spPr>
+          <a:xfrm>
+            <a:off x="9816083" y="262127"/>
+            <a:ext cx="1976627" cy="822960"/>
+          </a:xfrm>
+          <a:prstGeom prst="rect">
+            <a:avLst/>
+          </a:prstGeom>
+          <a:blipFill>
+            <a:blip r:embed="rId4" cstate="print"/>
+            <a:stretch>
+              <a:fillRect/>
+            </a:stretch>
+          </a:blipFill>
+        </p:spPr>
+        <p:txBody>
+          <a:bodyPr wrap="square" lIns="0" tIns="0" rIns="0" bIns="0" rtlCol="0"/>
+          <a:lstStyle/>
+          <a:p>
+            <a:endParaRPr/>
+          </a:p>
+        </p:txBody>
+      </p:sp>
+      <p:sp>
+        <p:nvSpPr>
+          <p:cNvPr id="7" name="TextBox 6">
+            <a:extLst>
+              <a:ext uri="{FF2B5EF4-FFF2-40B4-BE49-F238E27FC236}">
+                <a16:creationId xmlns:a16="http://schemas.microsoft.com/office/drawing/2014/main" id="{C2428796-F632-00B4-E484-CA738D260150}"/>
+              </a:ext>
+            </a:extLst>
+          </p:cNvPr>
+          <p:cNvSpPr txBox="1"/>
+          <p:nvPr/>
+        </p:nvSpPr>
+        <p:spPr>
+          <a:xfrm>
+            <a:off x="533400" y="1114485"/>
+            <a:ext cx="11582400" cy="6001643"/>
+          </a:xfrm>
+          <a:prstGeom prst="rect">
+            <a:avLst/>
+          </a:prstGeom>
+          <a:noFill/>
+        </p:spPr>
+        <p:txBody>
+          <a:bodyPr wrap="square" rtlCol="0">
+            <a:spAutoFit/>
+          </a:bodyPr>
+          <a:lstStyle/>
+          <a:p>
+            <a:r>
+              <a:rPr lang="en-US" sz="3200" dirty="0">
+                <a:solidFill>
+                  <a:schemeClr val="bg1"/>
+                </a:solidFill>
+                <a:latin typeface="+mj-lt"/>
+                <a:sym typeface="Wingdings" panose="05000000000000000000" pitchFamily="2" charset="2"/>
+              </a:rPr>
+              <a:t>Simpler way of Grid</a:t>
+            </a:r>
+          </a:p>
+          <a:p>
+            <a:endParaRPr lang="en-US" sz="3200" dirty="0">
+              <a:solidFill>
+                <a:schemeClr val="bg1"/>
+              </a:solidFill>
+              <a:latin typeface="+mj-lt"/>
+              <a:sym typeface="Wingdings" panose="05000000000000000000" pitchFamily="2" charset="2"/>
+            </a:endParaRPr>
+          </a:p>
+          <a:p>
+            <a:endParaRPr lang="en-US" sz="3200" dirty="0">
+              <a:solidFill>
+                <a:schemeClr val="bg1"/>
+              </a:solidFill>
+              <a:latin typeface="+mj-lt"/>
+              <a:sym typeface="Wingdings" panose="05000000000000000000" pitchFamily="2" charset="2"/>
+            </a:endParaRPr>
+          </a:p>
+          <a:p>
+            <a:endParaRPr lang="en-US" sz="3200" dirty="0">
+              <a:solidFill>
+                <a:schemeClr val="bg1"/>
+              </a:solidFill>
+              <a:latin typeface="+mj-lt"/>
+              <a:sym typeface="Wingdings" panose="05000000000000000000" pitchFamily="2" charset="2"/>
+            </a:endParaRPr>
+          </a:p>
+          <a:p>
+            <a:endParaRPr lang="en-US" sz="3200" dirty="0">
+              <a:solidFill>
+                <a:schemeClr val="bg1"/>
+              </a:solidFill>
+              <a:latin typeface="+mj-lt"/>
+              <a:sym typeface="Wingdings" panose="05000000000000000000" pitchFamily="2" charset="2"/>
+            </a:endParaRPr>
+          </a:p>
+          <a:p>
+            <a:r>
+              <a:rPr lang="en-US" sz="3200" dirty="0">
+                <a:solidFill>
+                  <a:schemeClr val="bg1"/>
+                </a:solidFill>
+                <a:latin typeface="+mj-lt"/>
+                <a:sym typeface="Wingdings" panose="05000000000000000000" pitchFamily="2" charset="2"/>
+              </a:rPr>
+              <a:t>1.grid-template-columns: 1fr 5fr 1fr;(fraction of space)</a:t>
+            </a:r>
+          </a:p>
+          <a:p>
+            <a:r>
+              <a:rPr lang="en-US" sz="3200" dirty="0">
+                <a:solidFill>
+                  <a:schemeClr val="bg1"/>
+                </a:solidFill>
+                <a:latin typeface="+mj-lt"/>
+                <a:sym typeface="Wingdings" panose="05000000000000000000" pitchFamily="2" charset="2"/>
+              </a:rPr>
+              <a:t>2. grid-template-rows : 1fr 5fr </a:t>
+            </a:r>
+            <a:r>
+              <a:rPr lang="en-US" sz="3200" dirty="0" err="1">
+                <a:solidFill>
+                  <a:schemeClr val="bg1"/>
+                </a:solidFill>
+                <a:latin typeface="+mj-lt"/>
+                <a:sym typeface="Wingdings" panose="05000000000000000000" pitchFamily="2" charset="2"/>
+              </a:rPr>
+              <a:t>5fr</a:t>
+            </a:r>
+            <a:r>
+              <a:rPr lang="en-US" sz="3200" dirty="0">
+                <a:solidFill>
+                  <a:schemeClr val="bg1"/>
+                </a:solidFill>
+                <a:latin typeface="+mj-lt"/>
+                <a:sym typeface="Wingdings" panose="05000000000000000000" pitchFamily="2" charset="2"/>
+              </a:rPr>
+              <a:t> 1fr;</a:t>
+            </a:r>
+          </a:p>
+          <a:p>
+            <a:r>
+              <a:rPr lang="en-US" sz="3200" dirty="0">
+                <a:solidFill>
+                  <a:schemeClr val="bg1"/>
+                </a:solidFill>
+                <a:latin typeface="+mj-lt"/>
+                <a:sym typeface="Wingdings" panose="05000000000000000000" pitchFamily="2" charset="2"/>
+              </a:rPr>
+              <a:t>3.grid-template-areas: 	“header </a:t>
+            </a:r>
+            <a:r>
+              <a:rPr lang="en-US" sz="3200" dirty="0" err="1">
+                <a:solidFill>
+                  <a:schemeClr val="bg1"/>
+                </a:solidFill>
+                <a:latin typeface="+mj-lt"/>
+                <a:sym typeface="Wingdings" panose="05000000000000000000" pitchFamily="2" charset="2"/>
+              </a:rPr>
+              <a:t>header</a:t>
+            </a:r>
+            <a:r>
+              <a:rPr lang="en-US" sz="3200" dirty="0">
+                <a:solidFill>
+                  <a:schemeClr val="bg1"/>
+                </a:solidFill>
+                <a:latin typeface="+mj-lt"/>
+                <a:sym typeface="Wingdings" panose="05000000000000000000" pitchFamily="2" charset="2"/>
+              </a:rPr>
+              <a:t> </a:t>
+            </a:r>
+            <a:r>
+              <a:rPr lang="en-US" sz="3200" dirty="0" err="1">
+                <a:solidFill>
+                  <a:schemeClr val="bg1"/>
+                </a:solidFill>
+                <a:latin typeface="+mj-lt"/>
+                <a:sym typeface="Wingdings" panose="05000000000000000000" pitchFamily="2" charset="2"/>
+              </a:rPr>
+              <a:t>header</a:t>
+            </a:r>
+            <a:r>
+              <a:rPr lang="en-US" sz="3200" dirty="0">
+                <a:solidFill>
+                  <a:schemeClr val="bg1"/>
+                </a:solidFill>
+                <a:latin typeface="+mj-lt"/>
+                <a:sym typeface="Wingdings" panose="05000000000000000000" pitchFamily="2" charset="2"/>
+              </a:rPr>
+              <a:t>”</a:t>
+            </a:r>
+          </a:p>
+          <a:p>
+            <a:r>
+              <a:rPr lang="en-US" sz="3200" dirty="0">
+                <a:solidFill>
+                  <a:schemeClr val="bg1"/>
+                </a:solidFill>
+                <a:latin typeface="+mj-lt"/>
+                <a:sym typeface="Wingdings" panose="05000000000000000000" pitchFamily="2" charset="2"/>
+              </a:rPr>
+              <a:t>				</a:t>
+            </a:r>
+            <a:r>
+              <a:rPr lang="en-IN" sz="3200" b="0" dirty="0">
+                <a:solidFill>
+                  <a:srgbClr val="CE9178"/>
+                </a:solidFill>
+                <a:effectLst/>
+                <a:latin typeface="Consolas" panose="020B0609020204030204" pitchFamily="49" charset="0"/>
+              </a:rPr>
+              <a:t> 	</a:t>
+            </a:r>
+            <a:r>
+              <a:rPr lang="en-IN" sz="3200" dirty="0">
+                <a:solidFill>
+                  <a:schemeClr val="bg1"/>
+                </a:solidFill>
+              </a:rPr>
+              <a:t>"nav1 main nav2"</a:t>
+            </a:r>
+          </a:p>
+          <a:p>
+            <a:r>
+              <a:rPr lang="en-IN" sz="3200" dirty="0">
+                <a:solidFill>
+                  <a:schemeClr val="bg1"/>
+                </a:solidFill>
+              </a:rPr>
+              <a:t>                        			"nav1 main nav3"</a:t>
+            </a:r>
+          </a:p>
+          <a:p>
+            <a:r>
+              <a:rPr lang="en-IN" sz="3200" dirty="0">
+                <a:solidFill>
+                  <a:schemeClr val="bg1"/>
+                </a:solidFill>
+              </a:rPr>
+              <a:t>                        			"footer </a:t>
+            </a:r>
+            <a:r>
+              <a:rPr lang="en-IN" sz="3200" dirty="0" err="1">
+                <a:solidFill>
+                  <a:schemeClr val="bg1"/>
+                </a:solidFill>
+              </a:rPr>
+              <a:t>footer</a:t>
+            </a:r>
+            <a:r>
+              <a:rPr lang="en-IN" sz="3200" dirty="0">
+                <a:solidFill>
+                  <a:schemeClr val="bg1"/>
+                </a:solidFill>
+              </a:rPr>
+              <a:t> </a:t>
+            </a:r>
+            <a:r>
+              <a:rPr lang="en-IN" sz="3200" dirty="0" err="1">
+                <a:solidFill>
+                  <a:schemeClr val="bg1"/>
+                </a:solidFill>
+              </a:rPr>
+              <a:t>footer</a:t>
+            </a:r>
+            <a:r>
+              <a:rPr lang="en-IN" sz="3200" dirty="0">
+                <a:solidFill>
+                  <a:schemeClr val="bg1"/>
+                </a:solidFill>
+              </a:rPr>
+              <a:t>“;</a:t>
+            </a:r>
+          </a:p>
+          <a:p>
+            <a:r>
+              <a:rPr lang="en-IN" sz="3200" dirty="0">
+                <a:solidFill>
+                  <a:schemeClr val="bg1"/>
+                </a:solidFill>
+                <a:latin typeface="+mj-lt"/>
+                <a:sym typeface="Wingdings" panose="05000000000000000000" pitchFamily="2" charset="2"/>
+              </a:rPr>
+              <a:t>Give </a:t>
+            </a:r>
+            <a:r>
+              <a:rPr lang="en-IN" sz="3200" dirty="0" err="1">
+                <a:solidFill>
+                  <a:schemeClr val="bg1"/>
+                </a:solidFill>
+                <a:latin typeface="+mj-lt"/>
+                <a:sym typeface="Wingdings" panose="05000000000000000000" pitchFamily="2" charset="2"/>
+              </a:rPr>
+              <a:t>childs</a:t>
+            </a:r>
+            <a:r>
+              <a:rPr lang="en-IN" sz="3200" dirty="0">
+                <a:solidFill>
+                  <a:schemeClr val="bg1"/>
+                </a:solidFill>
+                <a:latin typeface="+mj-lt"/>
+                <a:sym typeface="Wingdings" panose="05000000000000000000" pitchFamily="2" charset="2"/>
+              </a:rPr>
+              <a:t> individual names in ‘grid-area’ property.</a:t>
+            </a:r>
+            <a:endParaRPr lang="en-US" sz="3200" dirty="0">
+              <a:solidFill>
+                <a:schemeClr val="bg1"/>
+              </a:solidFill>
+              <a:latin typeface="+mj-lt"/>
+              <a:sym typeface="Wingdings" panose="05000000000000000000" pitchFamily="2" charset="2"/>
+            </a:endParaRPr>
+          </a:p>
+        </p:txBody>
+      </p:sp>
+      <p:pic>
+        <p:nvPicPr>
+          <p:cNvPr id="6" name="Picture 5">
+            <a:extLst>
+              <a:ext uri="{FF2B5EF4-FFF2-40B4-BE49-F238E27FC236}">
+                <a16:creationId xmlns:a16="http://schemas.microsoft.com/office/drawing/2014/main" id="{FB18A6E2-25F7-6D12-F1BC-0A2CF2DA5349}"/>
+              </a:ext>
+            </a:extLst>
+          </p:cNvPr>
+          <p:cNvPicPr>
+            <a:picLocks noChangeAspect="1"/>
+          </p:cNvPicPr>
+          <p:nvPr/>
+        </p:nvPicPr>
+        <p:blipFill>
+          <a:blip r:embed="rId5">
+            <a:duotone>
+              <a:prstClr val="black"/>
+              <a:schemeClr val="accent1">
+                <a:tint val="45000"/>
+                <a:satMod val="400000"/>
+              </a:schemeClr>
+            </a:duotone>
+          </a:blip>
+          <a:stretch>
+            <a:fillRect/>
+          </a:stretch>
+        </p:blipFill>
+        <p:spPr>
+          <a:xfrm>
+            <a:off x="4859492" y="415905"/>
+            <a:ext cx="4689892" cy="3167976"/>
+          </a:xfrm>
+          <a:prstGeom prst="rect">
+            <a:avLst/>
+          </a:prstGeom>
+        </p:spPr>
+      </p:pic>
+    </p:spTree>
+    <p:extLst>
+      <p:ext uri="{BB962C8B-B14F-4D97-AF65-F5344CB8AC3E}">
+        <p14:creationId xmlns:p14="http://schemas.microsoft.com/office/powerpoint/2010/main" val="902558809"/>
+      </p:ext>
+    </p:extLst>
+  </p:cSld>
+  <p:clrMapOvr>
+    <a:masterClrMapping/>
+  </p:clrMapOvr>
+</p:sld>
+</file>
+
+<file path=ppt/slides/slide42.xml><?xml version="1.0" encoding="utf-8"?>
+<p:sld xmlns:a="http://schemas.openxmlformats.org/drawingml/2006/main" xmlns:r="http://schemas.openxmlformats.org/officeDocument/2006/relationships" xmlns:p="http://schemas.openxmlformats.org/presentationml/2006/main">
+  <p:cSld>
+    <p:spTree>
+      <p:nvGrpSpPr>
+        <p:cNvPr id="1" name=""/>
+        <p:cNvGrpSpPr/>
+        <p:nvPr/>
+      </p:nvGrpSpPr>
+      <p:grpSpPr>
+        <a:xfrm>
+          <a:off x="0" y="0"/>
+          <a:ext cx="0" cy="0"/>
+          <a:chOff x="0" y="0"/>
+          <a:chExt cx="0" cy="0"/>
+        </a:xfrm>
+      </p:grpSpPr>
+      <p:sp>
+        <p:nvSpPr>
+          <p:cNvPr id="2" name="object 2"/>
+          <p:cNvSpPr/>
+          <p:nvPr/>
+        </p:nvSpPr>
+        <p:spPr>
+          <a:xfrm>
+            <a:off x="1" y="24581"/>
+            <a:ext cx="12191999" cy="7118601"/>
+          </a:xfrm>
+          <a:prstGeom prst="rect">
+            <a:avLst/>
+          </a:prstGeom>
+          <a:blipFill>
+            <a:blip r:embed="rId2" cstate="print"/>
+            <a:stretch>
+              <a:fillRect/>
+            </a:stretch>
+          </a:blipFill>
+        </p:spPr>
+        <p:txBody>
+          <a:bodyPr wrap="square" lIns="0" tIns="0" rIns="0" bIns="0" rtlCol="0"/>
+          <a:lstStyle/>
+          <a:p>
+            <a:endParaRPr b="1" dirty="0">
+              <a:ln w="13462">
+                <a:solidFill>
+                  <a:schemeClr val="bg1"/>
+                </a:solidFill>
+                <a:prstDash val="solid"/>
+              </a:ln>
+              <a:solidFill>
+                <a:schemeClr val="tx1">
+                  <a:lumMod val="85000"/>
+                  <a:lumOff val="15000"/>
+                </a:schemeClr>
+              </a:solidFill>
+              <a:effectLst>
+                <a:outerShdw dist="38100" dir="2700000" algn="bl" rotWithShape="0">
+                  <a:schemeClr val="accent5"/>
+                </a:outerShdw>
+              </a:effectLst>
+            </a:endParaRPr>
+          </a:p>
+        </p:txBody>
+      </p:sp>
+      <p:sp>
+        <p:nvSpPr>
+          <p:cNvPr id="3" name="object 3"/>
+          <p:cNvSpPr txBox="1">
+            <a:spLocks noGrp="1"/>
+          </p:cNvSpPr>
+          <p:nvPr>
+            <p:ph type="title"/>
+          </p:nvPr>
+        </p:nvSpPr>
+        <p:spPr>
+          <a:xfrm>
+            <a:off x="609600" y="533400"/>
+            <a:ext cx="4471315" cy="535403"/>
+          </a:xfrm>
+          <a:prstGeom prst="rect">
+            <a:avLst/>
+          </a:prstGeom>
+        </p:spPr>
+        <p:txBody>
+          <a:bodyPr vert="horz" wrap="square" lIns="0" tIns="12065" rIns="0" bIns="0" rtlCol="0">
+            <a:spAutoFit/>
+          </a:bodyPr>
+          <a:lstStyle/>
+          <a:p>
+            <a:pPr marL="12700">
+              <a:lnSpc>
+                <a:spcPct val="100000"/>
+              </a:lnSpc>
+              <a:spcBef>
+                <a:spcPts val="95"/>
+              </a:spcBef>
+            </a:pPr>
+            <a:r>
+              <a:rPr lang="en-US" sz="3400" dirty="0">
+                <a:latin typeface="Carlito"/>
+                <a:cs typeface="Carlito"/>
+              </a:rPr>
+              <a:t>Transform</a:t>
+            </a:r>
+            <a:endParaRPr sz="3400" dirty="0">
+              <a:solidFill>
+                <a:schemeClr val="tx2">
+                  <a:lumMod val="20000"/>
+                  <a:lumOff val="80000"/>
+                </a:schemeClr>
+              </a:solidFill>
+              <a:latin typeface="Carlito"/>
+              <a:cs typeface="Carlito"/>
+            </a:endParaRPr>
+          </a:p>
+        </p:txBody>
+      </p:sp>
+      <p:sp>
+        <p:nvSpPr>
+          <p:cNvPr id="5" name="object 5"/>
+          <p:cNvSpPr/>
+          <p:nvPr/>
+        </p:nvSpPr>
+        <p:spPr>
+          <a:xfrm>
+            <a:off x="9816083" y="262127"/>
+            <a:ext cx="1976627" cy="822960"/>
+          </a:xfrm>
+          <a:prstGeom prst="rect">
+            <a:avLst/>
+          </a:prstGeom>
+          <a:blipFill>
+            <a:blip r:embed="rId3" cstate="print"/>
+            <a:stretch>
+              <a:fillRect/>
+            </a:stretch>
+          </a:blipFill>
+        </p:spPr>
+        <p:txBody>
+          <a:bodyPr wrap="square" lIns="0" tIns="0" rIns="0" bIns="0" rtlCol="0"/>
+          <a:lstStyle/>
+          <a:p>
+            <a:endParaRPr/>
+          </a:p>
+        </p:txBody>
+      </p:sp>
+      <p:sp>
+        <p:nvSpPr>
+          <p:cNvPr id="7" name="TextBox 6">
+            <a:extLst>
+              <a:ext uri="{FF2B5EF4-FFF2-40B4-BE49-F238E27FC236}">
+                <a16:creationId xmlns:a16="http://schemas.microsoft.com/office/drawing/2014/main" id="{C2428796-F632-00B4-E484-CA738D260150}"/>
+              </a:ext>
+            </a:extLst>
+          </p:cNvPr>
+          <p:cNvSpPr txBox="1"/>
+          <p:nvPr/>
+        </p:nvSpPr>
+        <p:spPr>
+          <a:xfrm>
+            <a:off x="533400" y="1114485"/>
+            <a:ext cx="11582400" cy="4031873"/>
+          </a:xfrm>
+          <a:prstGeom prst="rect">
+            <a:avLst/>
+          </a:prstGeom>
+          <a:noFill/>
+        </p:spPr>
+        <p:txBody>
+          <a:bodyPr wrap="square" rtlCol="0">
+            <a:spAutoFit/>
+          </a:bodyPr>
+          <a:lstStyle/>
+          <a:p>
+            <a:r>
+              <a:rPr lang="en-US" sz="3200" dirty="0">
+                <a:solidFill>
+                  <a:schemeClr val="bg1"/>
+                </a:solidFill>
+                <a:latin typeface="+mj-lt"/>
+                <a:sym typeface="Wingdings" panose="05000000000000000000" pitchFamily="2" charset="2"/>
+              </a:rPr>
+              <a:t>Changes to an Object</a:t>
+            </a:r>
+          </a:p>
+          <a:p>
+            <a:endParaRPr lang="en-US" sz="3200" dirty="0">
+              <a:solidFill>
+                <a:schemeClr val="bg1"/>
+              </a:solidFill>
+              <a:latin typeface="+mj-lt"/>
+              <a:sym typeface="Wingdings" panose="05000000000000000000" pitchFamily="2" charset="2"/>
+            </a:endParaRPr>
+          </a:p>
+          <a:p>
+            <a:r>
+              <a:rPr lang="en-US" sz="3200" dirty="0">
+                <a:solidFill>
+                  <a:schemeClr val="bg1"/>
+                </a:solidFill>
+                <a:latin typeface="+mj-lt"/>
+                <a:sym typeface="Wingdings" panose="05000000000000000000" pitchFamily="2" charset="2"/>
+              </a:rPr>
+              <a:t>Properties:</a:t>
+            </a:r>
+          </a:p>
+          <a:p>
+            <a:r>
+              <a:rPr lang="en-US" sz="3200" dirty="0">
+                <a:solidFill>
+                  <a:schemeClr val="bg1"/>
+                </a:solidFill>
+                <a:latin typeface="+mj-lt"/>
+                <a:sym typeface="Wingdings" panose="05000000000000000000" pitchFamily="2" charset="2"/>
+              </a:rPr>
+              <a:t>1.transform : </a:t>
+            </a:r>
+            <a:r>
+              <a:rPr lang="en-US" sz="3200" dirty="0" err="1">
+                <a:solidFill>
+                  <a:schemeClr val="bg1"/>
+                </a:solidFill>
+                <a:latin typeface="+mj-lt"/>
+                <a:sym typeface="Wingdings" panose="05000000000000000000" pitchFamily="2" charset="2"/>
+              </a:rPr>
+              <a:t>translateX</a:t>
+            </a:r>
+            <a:r>
+              <a:rPr lang="en-US" sz="3200" dirty="0">
+                <a:solidFill>
+                  <a:schemeClr val="bg1"/>
+                </a:solidFill>
+                <a:latin typeface="+mj-lt"/>
+                <a:sym typeface="Wingdings" panose="05000000000000000000" pitchFamily="2" charset="2"/>
+              </a:rPr>
+              <a:t>(400px), </a:t>
+            </a:r>
+            <a:r>
+              <a:rPr lang="en-US" sz="3200" dirty="0" err="1">
+                <a:solidFill>
+                  <a:schemeClr val="bg1"/>
+                </a:solidFill>
+                <a:latin typeface="+mj-lt"/>
+                <a:sym typeface="Wingdings" panose="05000000000000000000" pitchFamily="2" charset="2"/>
+              </a:rPr>
+              <a:t>translateY</a:t>
+            </a:r>
+            <a:r>
+              <a:rPr lang="en-US" sz="3200" dirty="0">
+                <a:solidFill>
+                  <a:schemeClr val="bg1"/>
+                </a:solidFill>
+                <a:latin typeface="+mj-lt"/>
+                <a:sym typeface="Wingdings" panose="05000000000000000000" pitchFamily="2" charset="2"/>
+              </a:rPr>
+              <a:t>(400px), </a:t>
+            </a:r>
+            <a:r>
+              <a:rPr lang="en-US" sz="3200" dirty="0" err="1">
+                <a:solidFill>
+                  <a:schemeClr val="bg1"/>
+                </a:solidFill>
+                <a:latin typeface="+mj-lt"/>
+                <a:sym typeface="Wingdings" panose="05000000000000000000" pitchFamily="2" charset="2"/>
+              </a:rPr>
+              <a:t>translateZ</a:t>
+            </a:r>
+            <a:r>
+              <a:rPr lang="en-US" sz="3200" dirty="0">
+                <a:solidFill>
+                  <a:schemeClr val="bg1"/>
+                </a:solidFill>
+                <a:latin typeface="+mj-lt"/>
+                <a:sym typeface="Wingdings" panose="05000000000000000000" pitchFamily="2" charset="2"/>
+              </a:rPr>
+              <a:t>(400px)</a:t>
+            </a:r>
+          </a:p>
+          <a:p>
+            <a:r>
+              <a:rPr lang="en-US" sz="3200" dirty="0">
+                <a:solidFill>
+                  <a:schemeClr val="bg1"/>
+                </a:solidFill>
+                <a:latin typeface="+mj-lt"/>
+                <a:sym typeface="Wingdings" panose="05000000000000000000" pitchFamily="2" charset="2"/>
+              </a:rPr>
+              <a:t>2.transform : </a:t>
+            </a:r>
+            <a:r>
+              <a:rPr lang="en-US" sz="3200" dirty="0" err="1">
+                <a:solidFill>
+                  <a:schemeClr val="bg1"/>
+                </a:solidFill>
+                <a:latin typeface="+mj-lt"/>
+                <a:sym typeface="Wingdings" panose="05000000000000000000" pitchFamily="2" charset="2"/>
+              </a:rPr>
+              <a:t>rotateX</a:t>
+            </a:r>
+            <a:r>
+              <a:rPr lang="en-US" sz="3200" dirty="0">
+                <a:solidFill>
+                  <a:schemeClr val="bg1"/>
+                </a:solidFill>
+                <a:latin typeface="+mj-lt"/>
+                <a:sym typeface="Wingdings" panose="05000000000000000000" pitchFamily="2" charset="2"/>
+              </a:rPr>
+              <a:t>(180deg), </a:t>
+            </a:r>
+            <a:r>
+              <a:rPr lang="en-US" sz="3200" dirty="0" err="1">
+                <a:solidFill>
+                  <a:schemeClr val="bg1"/>
+                </a:solidFill>
+                <a:latin typeface="+mj-lt"/>
+                <a:sym typeface="Wingdings" panose="05000000000000000000" pitchFamily="2" charset="2"/>
+              </a:rPr>
+              <a:t>rotateY</a:t>
+            </a:r>
+            <a:r>
+              <a:rPr lang="en-US" sz="3200" dirty="0">
+                <a:solidFill>
+                  <a:schemeClr val="bg1"/>
+                </a:solidFill>
+                <a:latin typeface="+mj-lt"/>
+                <a:sym typeface="Wingdings" panose="05000000000000000000" pitchFamily="2" charset="2"/>
+              </a:rPr>
+              <a:t>(180deg), </a:t>
+            </a:r>
+            <a:r>
+              <a:rPr lang="en-US" sz="3200" dirty="0" err="1">
+                <a:solidFill>
+                  <a:schemeClr val="bg1"/>
+                </a:solidFill>
+                <a:latin typeface="+mj-lt"/>
+                <a:sym typeface="Wingdings" panose="05000000000000000000" pitchFamily="2" charset="2"/>
+              </a:rPr>
+              <a:t>rotateZ</a:t>
+            </a:r>
+            <a:r>
+              <a:rPr lang="en-US" sz="3200" dirty="0">
+                <a:solidFill>
+                  <a:schemeClr val="bg1"/>
+                </a:solidFill>
+                <a:latin typeface="+mj-lt"/>
+                <a:sym typeface="Wingdings" panose="05000000000000000000" pitchFamily="2" charset="2"/>
+              </a:rPr>
+              <a:t>(360deg)</a:t>
+            </a:r>
+          </a:p>
+          <a:p>
+            <a:r>
+              <a:rPr lang="en-US" sz="3200" dirty="0">
+                <a:solidFill>
+                  <a:schemeClr val="bg1"/>
+                </a:solidFill>
+                <a:latin typeface="+mj-lt"/>
+                <a:sym typeface="Wingdings" panose="05000000000000000000" pitchFamily="2" charset="2"/>
+              </a:rPr>
+              <a:t>3.transform : </a:t>
+            </a:r>
+            <a:r>
+              <a:rPr lang="en-US" sz="3200" dirty="0" err="1">
+                <a:solidFill>
+                  <a:schemeClr val="bg1"/>
+                </a:solidFill>
+                <a:latin typeface="+mj-lt"/>
+                <a:sym typeface="Wingdings" panose="05000000000000000000" pitchFamily="2" charset="2"/>
+              </a:rPr>
+              <a:t>scaleX</a:t>
+            </a:r>
+            <a:r>
+              <a:rPr lang="en-US" sz="3200" dirty="0">
+                <a:solidFill>
+                  <a:schemeClr val="bg1"/>
+                </a:solidFill>
+                <a:latin typeface="+mj-lt"/>
+                <a:sym typeface="Wingdings" panose="05000000000000000000" pitchFamily="2" charset="2"/>
+              </a:rPr>
+              <a:t>(1.5), </a:t>
+            </a:r>
+            <a:r>
+              <a:rPr lang="en-US" sz="3200" dirty="0" err="1">
+                <a:solidFill>
+                  <a:schemeClr val="bg1"/>
+                </a:solidFill>
+                <a:latin typeface="+mj-lt"/>
+                <a:sym typeface="Wingdings" panose="05000000000000000000" pitchFamily="2" charset="2"/>
+              </a:rPr>
+              <a:t>scaleY</a:t>
+            </a:r>
+            <a:r>
+              <a:rPr lang="en-US" sz="3200" dirty="0">
+                <a:solidFill>
+                  <a:schemeClr val="bg1"/>
+                </a:solidFill>
+                <a:latin typeface="+mj-lt"/>
+                <a:sym typeface="Wingdings" panose="05000000000000000000" pitchFamily="2" charset="2"/>
+              </a:rPr>
+              <a:t>(1.5), (scale(1.5,1.5)(shorthand))</a:t>
+            </a:r>
+          </a:p>
+          <a:p>
+            <a:r>
+              <a:rPr lang="en-US" sz="3200" dirty="0">
+                <a:solidFill>
+                  <a:schemeClr val="bg1"/>
+                </a:solidFill>
+                <a:latin typeface="+mj-lt"/>
+                <a:sym typeface="Wingdings" panose="05000000000000000000" pitchFamily="2" charset="2"/>
+              </a:rPr>
+              <a:t>4.transform : </a:t>
+            </a:r>
+            <a:r>
+              <a:rPr lang="en-US" sz="3200" dirty="0" err="1">
+                <a:solidFill>
+                  <a:schemeClr val="bg1"/>
+                </a:solidFill>
+                <a:latin typeface="+mj-lt"/>
+                <a:sym typeface="Wingdings" panose="05000000000000000000" pitchFamily="2" charset="2"/>
+              </a:rPr>
+              <a:t>skewX</a:t>
+            </a:r>
+            <a:r>
+              <a:rPr lang="en-US" sz="3200" dirty="0">
+                <a:solidFill>
+                  <a:schemeClr val="bg1"/>
+                </a:solidFill>
+                <a:latin typeface="+mj-lt"/>
+                <a:sym typeface="Wingdings" panose="05000000000000000000" pitchFamily="2" charset="2"/>
+              </a:rPr>
+              <a:t>(1.5), </a:t>
+            </a:r>
+            <a:r>
+              <a:rPr lang="en-US" sz="3200" dirty="0" err="1">
+                <a:solidFill>
+                  <a:schemeClr val="bg1"/>
+                </a:solidFill>
+                <a:latin typeface="+mj-lt"/>
+                <a:sym typeface="Wingdings" panose="05000000000000000000" pitchFamily="2" charset="2"/>
+              </a:rPr>
+              <a:t>skewY</a:t>
+            </a:r>
+            <a:r>
+              <a:rPr lang="en-US" sz="3200" dirty="0">
+                <a:solidFill>
+                  <a:schemeClr val="bg1"/>
+                </a:solidFill>
+                <a:latin typeface="+mj-lt"/>
+                <a:sym typeface="Wingdings" panose="05000000000000000000" pitchFamily="2" charset="2"/>
+              </a:rPr>
+              <a:t>(1.5), (scale(1.5,1.5)(shorthand))</a:t>
+            </a:r>
+          </a:p>
+          <a:p>
+            <a:endParaRPr lang="en-US" sz="3200" dirty="0">
+              <a:solidFill>
+                <a:schemeClr val="bg1"/>
+              </a:solidFill>
+              <a:latin typeface="+mj-lt"/>
+              <a:sym typeface="Wingdings" panose="05000000000000000000" pitchFamily="2" charset="2"/>
+            </a:endParaRPr>
+          </a:p>
+        </p:txBody>
+      </p:sp>
+    </p:spTree>
+    <p:extLst>
+      <p:ext uri="{BB962C8B-B14F-4D97-AF65-F5344CB8AC3E}">
+        <p14:creationId xmlns:p14="http://schemas.microsoft.com/office/powerpoint/2010/main" val="1513809848"/>
+      </p:ext>
+    </p:extLst>
+  </p:cSld>
+  <p:clrMapOvr>
+    <a:masterClrMapping/>
+  </p:clrMapOvr>
+</p:sld>
+</file>
+
+<file path=ppt/slides/slide43.xml><?xml version="1.0" encoding="utf-8"?>
+<p:sld xmlns:a="http://schemas.openxmlformats.org/drawingml/2006/main" xmlns:r="http://schemas.openxmlformats.org/officeDocument/2006/relationships" xmlns:p="http://schemas.openxmlformats.org/presentationml/2006/main">
+  <p:cSld>
+    <p:spTree>
+      <p:nvGrpSpPr>
+        <p:cNvPr id="1" name=""/>
+        <p:cNvGrpSpPr/>
+        <p:nvPr/>
+      </p:nvGrpSpPr>
+      <p:grpSpPr>
+        <a:xfrm>
+          <a:off x="0" y="0"/>
+          <a:ext cx="0" cy="0"/>
+          <a:chOff x="0" y="0"/>
+          <a:chExt cx="0" cy="0"/>
+        </a:xfrm>
+      </p:grpSpPr>
+      <p:sp>
+        <p:nvSpPr>
+          <p:cNvPr id="2" name="object 2"/>
+          <p:cNvSpPr/>
+          <p:nvPr/>
+        </p:nvSpPr>
+        <p:spPr>
+          <a:xfrm>
+            <a:off x="1" y="24581"/>
+            <a:ext cx="12191999" cy="7118601"/>
+          </a:xfrm>
+          <a:prstGeom prst="rect">
+            <a:avLst/>
+          </a:prstGeom>
+          <a:blipFill>
+            <a:blip r:embed="rId2" cstate="print"/>
+            <a:stretch>
+              <a:fillRect/>
+            </a:stretch>
+          </a:blipFill>
+        </p:spPr>
+        <p:txBody>
+          <a:bodyPr wrap="square" lIns="0" tIns="0" rIns="0" bIns="0" rtlCol="0"/>
+          <a:lstStyle/>
+          <a:p>
+            <a:endParaRPr b="1" dirty="0">
+              <a:ln w="13462">
+                <a:solidFill>
+                  <a:schemeClr val="bg1"/>
+                </a:solidFill>
+                <a:prstDash val="solid"/>
+              </a:ln>
+              <a:solidFill>
+                <a:schemeClr val="tx1">
+                  <a:lumMod val="85000"/>
+                  <a:lumOff val="15000"/>
+                </a:schemeClr>
+              </a:solidFill>
+              <a:effectLst>
+                <a:outerShdw dist="38100" dir="2700000" algn="bl" rotWithShape="0">
+                  <a:schemeClr val="accent5"/>
+                </a:outerShdw>
+              </a:effectLst>
+            </a:endParaRPr>
+          </a:p>
+        </p:txBody>
+      </p:sp>
+      <p:sp>
+        <p:nvSpPr>
+          <p:cNvPr id="3" name="object 3"/>
+          <p:cNvSpPr txBox="1">
+            <a:spLocks noGrp="1"/>
+          </p:cNvSpPr>
+          <p:nvPr>
+            <p:ph type="title"/>
+          </p:nvPr>
+        </p:nvSpPr>
+        <p:spPr>
+          <a:xfrm>
+            <a:off x="609600" y="533400"/>
+            <a:ext cx="4471315" cy="535403"/>
+          </a:xfrm>
+          <a:prstGeom prst="rect">
+            <a:avLst/>
+          </a:prstGeom>
+        </p:spPr>
+        <p:txBody>
+          <a:bodyPr vert="horz" wrap="square" lIns="0" tIns="12065" rIns="0" bIns="0" rtlCol="0">
+            <a:spAutoFit/>
+          </a:bodyPr>
+          <a:lstStyle/>
+          <a:p>
+            <a:pPr marL="12700">
+              <a:lnSpc>
+                <a:spcPct val="100000"/>
+              </a:lnSpc>
+              <a:spcBef>
+                <a:spcPts val="95"/>
+              </a:spcBef>
+            </a:pPr>
+            <a:r>
+              <a:rPr lang="en-US" sz="3400" dirty="0">
+                <a:latin typeface="Carlito"/>
+                <a:cs typeface="Carlito"/>
+              </a:rPr>
+              <a:t>Transform</a:t>
+            </a:r>
+            <a:endParaRPr sz="3400" dirty="0">
+              <a:solidFill>
+                <a:schemeClr val="tx2">
+                  <a:lumMod val="20000"/>
+                  <a:lumOff val="80000"/>
+                </a:schemeClr>
+              </a:solidFill>
+              <a:latin typeface="Carlito"/>
+              <a:cs typeface="Carlito"/>
+            </a:endParaRPr>
+          </a:p>
+        </p:txBody>
+      </p:sp>
+      <p:sp>
+        <p:nvSpPr>
+          <p:cNvPr id="5" name="object 5"/>
+          <p:cNvSpPr/>
+          <p:nvPr/>
+        </p:nvSpPr>
+        <p:spPr>
+          <a:xfrm>
+            <a:off x="9816083" y="262127"/>
+            <a:ext cx="1976627" cy="822960"/>
+          </a:xfrm>
+          <a:prstGeom prst="rect">
+            <a:avLst/>
+          </a:prstGeom>
+          <a:blipFill>
+            <a:blip r:embed="rId3" cstate="print"/>
+            <a:stretch>
+              <a:fillRect/>
+            </a:stretch>
+          </a:blipFill>
+        </p:spPr>
+        <p:txBody>
+          <a:bodyPr wrap="square" lIns="0" tIns="0" rIns="0" bIns="0" rtlCol="0"/>
+          <a:lstStyle/>
+          <a:p>
+            <a:endParaRPr/>
+          </a:p>
+        </p:txBody>
+      </p:sp>
+      <p:sp>
+        <p:nvSpPr>
+          <p:cNvPr id="7" name="TextBox 6">
+            <a:extLst>
+              <a:ext uri="{FF2B5EF4-FFF2-40B4-BE49-F238E27FC236}">
+                <a16:creationId xmlns:a16="http://schemas.microsoft.com/office/drawing/2014/main" id="{C2428796-F632-00B4-E484-CA738D260150}"/>
+              </a:ext>
+            </a:extLst>
+          </p:cNvPr>
+          <p:cNvSpPr txBox="1"/>
+          <p:nvPr/>
+        </p:nvSpPr>
+        <p:spPr>
+          <a:xfrm>
+            <a:off x="533400" y="1114485"/>
+            <a:ext cx="11582400" cy="5509200"/>
+          </a:xfrm>
+          <a:prstGeom prst="rect">
+            <a:avLst/>
+          </a:prstGeom>
+          <a:noFill/>
+        </p:spPr>
+        <p:txBody>
+          <a:bodyPr wrap="square" rtlCol="0">
+            <a:spAutoFit/>
+          </a:bodyPr>
+          <a:lstStyle/>
+          <a:p>
+            <a:r>
+              <a:rPr lang="en-US" sz="3200" dirty="0">
+                <a:solidFill>
+                  <a:schemeClr val="bg1"/>
+                </a:solidFill>
+                <a:latin typeface="+mj-lt"/>
+                <a:sym typeface="Wingdings" panose="05000000000000000000" pitchFamily="2" charset="2"/>
+              </a:rPr>
+              <a:t>Project : Rotating Card</a:t>
+            </a:r>
+          </a:p>
+          <a:p>
+            <a:endParaRPr lang="en-US" sz="3200" dirty="0">
+              <a:solidFill>
+                <a:schemeClr val="bg1"/>
+              </a:solidFill>
+              <a:latin typeface="+mj-lt"/>
+              <a:sym typeface="Wingdings" panose="05000000000000000000" pitchFamily="2" charset="2"/>
+            </a:endParaRPr>
+          </a:p>
+          <a:p>
+            <a:r>
+              <a:rPr lang="en-US" sz="3200" dirty="0">
+                <a:solidFill>
+                  <a:schemeClr val="bg1"/>
+                </a:solidFill>
+                <a:latin typeface="+mj-lt"/>
+                <a:sym typeface="Wingdings" panose="05000000000000000000" pitchFamily="2" charset="2"/>
+              </a:rPr>
+              <a:t>1.We make 2 faces : Face A and Face B make them absolute</a:t>
+            </a:r>
+          </a:p>
+          <a:p>
+            <a:r>
+              <a:rPr lang="en-US" sz="3200" dirty="0">
+                <a:solidFill>
+                  <a:schemeClr val="bg1"/>
+                </a:solidFill>
+                <a:latin typeface="+mj-lt"/>
+                <a:sym typeface="Wingdings" panose="05000000000000000000" pitchFamily="2" charset="2"/>
+              </a:rPr>
+              <a:t>2.Make their parent relative.</a:t>
+            </a:r>
+          </a:p>
+          <a:p>
+            <a:r>
+              <a:rPr lang="en-US" sz="3200" dirty="0">
+                <a:solidFill>
+                  <a:schemeClr val="bg1"/>
+                </a:solidFill>
+                <a:latin typeface="+mj-lt"/>
+                <a:sym typeface="Wingdings" panose="05000000000000000000" pitchFamily="2" charset="2"/>
+              </a:rPr>
+              <a:t>3.In </a:t>
+            </a:r>
+            <a:r>
+              <a:rPr lang="en-US" sz="3200" dirty="0" err="1">
+                <a:solidFill>
+                  <a:schemeClr val="bg1"/>
+                </a:solidFill>
+                <a:latin typeface="+mj-lt"/>
+                <a:sym typeface="Wingdings" panose="05000000000000000000" pitchFamily="2" charset="2"/>
+              </a:rPr>
+              <a:t>FaceA</a:t>
+            </a:r>
+            <a:r>
+              <a:rPr lang="en-US" sz="3200" dirty="0">
+                <a:solidFill>
+                  <a:schemeClr val="bg1"/>
+                </a:solidFill>
+                <a:latin typeface="+mj-lt"/>
+                <a:sym typeface="Wingdings" panose="05000000000000000000" pitchFamily="2" charset="2"/>
+              </a:rPr>
+              <a:t> use z-index:1; and </a:t>
+            </a:r>
+            <a:r>
+              <a:rPr lang="en-US" sz="3200" dirty="0" err="1">
+                <a:solidFill>
+                  <a:schemeClr val="bg1"/>
+                </a:solidFill>
+                <a:latin typeface="+mj-lt"/>
+                <a:sym typeface="Wingdings" panose="05000000000000000000" pitchFamily="2" charset="2"/>
+              </a:rPr>
+              <a:t>backface</a:t>
+            </a:r>
+            <a:r>
+              <a:rPr lang="en-US" sz="3200" dirty="0">
+                <a:solidFill>
+                  <a:schemeClr val="bg1"/>
+                </a:solidFill>
+                <a:latin typeface="+mj-lt"/>
+                <a:sym typeface="Wingdings" panose="05000000000000000000" pitchFamily="2" charset="2"/>
+              </a:rPr>
+              <a:t>-visibility : hidden;</a:t>
+            </a:r>
+          </a:p>
+          <a:p>
+            <a:r>
+              <a:rPr lang="en-US" sz="3200" dirty="0">
+                <a:solidFill>
+                  <a:schemeClr val="bg1"/>
+                </a:solidFill>
+                <a:latin typeface="+mj-lt"/>
+                <a:sym typeface="Wingdings" panose="05000000000000000000" pitchFamily="2" charset="2"/>
+              </a:rPr>
+              <a:t>4.In </a:t>
+            </a:r>
+            <a:r>
+              <a:rPr lang="en-US" sz="3200" dirty="0" err="1">
+                <a:solidFill>
+                  <a:schemeClr val="bg1"/>
+                </a:solidFill>
+                <a:latin typeface="+mj-lt"/>
+                <a:sym typeface="Wingdings" panose="05000000000000000000" pitchFamily="2" charset="2"/>
+              </a:rPr>
+              <a:t>FaceB</a:t>
+            </a:r>
+            <a:r>
+              <a:rPr lang="en-US" sz="3200" dirty="0">
+                <a:solidFill>
+                  <a:schemeClr val="bg1"/>
+                </a:solidFill>
+                <a:latin typeface="+mj-lt"/>
+                <a:sym typeface="Wingdings" panose="05000000000000000000" pitchFamily="2" charset="2"/>
+              </a:rPr>
+              <a:t> use </a:t>
+            </a:r>
+            <a:r>
+              <a:rPr lang="en-IN" sz="3200" dirty="0">
+                <a:solidFill>
+                  <a:schemeClr val="bg1"/>
+                </a:solidFill>
+              </a:rPr>
+              <a:t>transform: </a:t>
+            </a:r>
+            <a:r>
+              <a:rPr lang="en-IN" sz="3200" dirty="0" err="1">
+                <a:solidFill>
+                  <a:schemeClr val="bg1"/>
+                </a:solidFill>
+              </a:rPr>
+              <a:t>rotateY</a:t>
+            </a:r>
+            <a:r>
+              <a:rPr lang="en-IN" sz="3200" dirty="0">
+                <a:solidFill>
+                  <a:schemeClr val="bg1"/>
+                </a:solidFill>
+              </a:rPr>
+              <a:t>(180deg);</a:t>
+            </a:r>
+          </a:p>
+          <a:p>
+            <a:r>
+              <a:rPr lang="en-IN" sz="3200" dirty="0">
+                <a:solidFill>
+                  <a:schemeClr val="bg1"/>
+                </a:solidFill>
+              </a:rPr>
+              <a:t>5.In parent use transition , transform-style : preserve-3d;</a:t>
+            </a:r>
+          </a:p>
+          <a:p>
+            <a:r>
+              <a:rPr lang="en-IN" sz="3200" dirty="0">
+                <a:solidFill>
+                  <a:schemeClr val="bg1"/>
+                </a:solidFill>
+              </a:rPr>
+              <a:t>6.in parent’s parent i.e., body use perspective:900px;</a:t>
+            </a:r>
+          </a:p>
+          <a:p>
+            <a:r>
+              <a:rPr lang="en-IN" sz="3200" b="0" dirty="0">
+                <a:solidFill>
+                  <a:schemeClr val="bg1"/>
+                </a:solidFill>
+                <a:effectLst/>
+                <a:latin typeface="+mj-lt"/>
+                <a:cs typeface="Calibri Light" panose="020F0302020204030204" pitchFamily="34" charset="0"/>
+              </a:rPr>
+              <a:t>7.use hover effect where it is necessary</a:t>
+            </a:r>
+            <a:endParaRPr lang="en-IN" sz="3200" b="0" dirty="0">
+              <a:solidFill>
+                <a:schemeClr val="tx2">
+                  <a:lumMod val="20000"/>
+                  <a:lumOff val="80000"/>
+                </a:schemeClr>
+              </a:solidFill>
+              <a:effectLst/>
+              <a:latin typeface="+mj-lt"/>
+              <a:cs typeface="Calibri Light" panose="020F0302020204030204" pitchFamily="34" charset="0"/>
+            </a:endParaRPr>
+          </a:p>
+          <a:p>
+            <a:endParaRPr lang="en-US" sz="3200" dirty="0">
+              <a:solidFill>
+                <a:schemeClr val="bg1"/>
+              </a:solidFill>
+              <a:latin typeface="+mj-lt"/>
+              <a:sym typeface="Wingdings" panose="05000000000000000000" pitchFamily="2" charset="2"/>
+            </a:endParaRPr>
+          </a:p>
+          <a:p>
+            <a:endParaRPr lang="en-US" sz="3200" dirty="0">
+              <a:solidFill>
+                <a:schemeClr val="bg1"/>
+              </a:solidFill>
+              <a:latin typeface="+mj-lt"/>
+              <a:sym typeface="Wingdings" panose="05000000000000000000" pitchFamily="2" charset="2"/>
+            </a:endParaRPr>
+          </a:p>
+        </p:txBody>
+      </p:sp>
+    </p:spTree>
+    <p:extLst>
+      <p:ext uri="{BB962C8B-B14F-4D97-AF65-F5344CB8AC3E}">
+        <p14:creationId xmlns:p14="http://schemas.microsoft.com/office/powerpoint/2010/main" val="2550693951"/>
+      </p:ext>
+    </p:extLst>
+  </p:cSld>
+  <p:clrMapOvr>
+    <a:masterClrMapping/>
+  </p:clrMapOvr>
+</p:sld>
+</file>
+
+<file path=ppt/slides/slide44.xml><?xml version="1.0" encoding="utf-8"?>
+<p:sld xmlns:a="http://schemas.openxmlformats.org/drawingml/2006/main" xmlns:r="http://schemas.openxmlformats.org/officeDocument/2006/relationships" xmlns:p="http://schemas.openxmlformats.org/presentationml/2006/main">
+  <p:cSld>
+    <p:spTree>
+      <p:nvGrpSpPr>
+        <p:cNvPr id="1" name=""/>
+        <p:cNvGrpSpPr/>
+        <p:nvPr/>
+      </p:nvGrpSpPr>
+      <p:grpSpPr>
+        <a:xfrm>
+          <a:off x="0" y="0"/>
+          <a:ext cx="0" cy="0"/>
+          <a:chOff x="0" y="0"/>
+          <a:chExt cx="0" cy="0"/>
+        </a:xfrm>
+      </p:grpSpPr>
+      <p:sp>
+        <p:nvSpPr>
+          <p:cNvPr id="2" name="object 2"/>
+          <p:cNvSpPr/>
+          <p:nvPr/>
+        </p:nvSpPr>
+        <p:spPr>
+          <a:xfrm>
+            <a:off x="1" y="24581"/>
+            <a:ext cx="12191999" cy="7118601"/>
+          </a:xfrm>
+          <a:prstGeom prst="rect">
+            <a:avLst/>
+          </a:prstGeom>
+          <a:blipFill>
+            <a:blip r:embed="rId2" cstate="print"/>
+            <a:stretch>
+              <a:fillRect/>
+            </a:stretch>
+          </a:blipFill>
+        </p:spPr>
+        <p:txBody>
+          <a:bodyPr wrap="square" lIns="0" tIns="0" rIns="0" bIns="0" rtlCol="0"/>
+          <a:lstStyle/>
+          <a:p>
+            <a:endParaRPr b="1" dirty="0">
+              <a:ln w="13462">
+                <a:solidFill>
+                  <a:schemeClr val="bg1"/>
+                </a:solidFill>
+                <a:prstDash val="solid"/>
+              </a:ln>
+              <a:solidFill>
+                <a:schemeClr val="tx1">
+                  <a:lumMod val="85000"/>
+                  <a:lumOff val="15000"/>
+                </a:schemeClr>
+              </a:solidFill>
+              <a:effectLst>
+                <a:outerShdw dist="38100" dir="2700000" algn="bl" rotWithShape="0">
+                  <a:schemeClr val="accent5"/>
+                </a:outerShdw>
+              </a:effectLst>
+            </a:endParaRPr>
+          </a:p>
+        </p:txBody>
+      </p:sp>
+      <p:sp>
+        <p:nvSpPr>
+          <p:cNvPr id="3" name="object 3"/>
+          <p:cNvSpPr txBox="1">
+            <a:spLocks noGrp="1"/>
+          </p:cNvSpPr>
+          <p:nvPr>
+            <p:ph type="title"/>
+          </p:nvPr>
+        </p:nvSpPr>
+        <p:spPr>
+          <a:xfrm>
+            <a:off x="609600" y="457200"/>
+            <a:ext cx="4471315" cy="535403"/>
+          </a:xfrm>
+          <a:prstGeom prst="rect">
+            <a:avLst/>
+          </a:prstGeom>
+        </p:spPr>
+        <p:txBody>
+          <a:bodyPr vert="horz" wrap="square" lIns="0" tIns="12065" rIns="0" bIns="0" rtlCol="0">
+            <a:spAutoFit/>
+          </a:bodyPr>
+          <a:lstStyle/>
+          <a:p>
+            <a:pPr marL="12700">
+              <a:lnSpc>
+                <a:spcPct val="100000"/>
+              </a:lnSpc>
+              <a:spcBef>
+                <a:spcPts val="95"/>
+              </a:spcBef>
+            </a:pPr>
+            <a:r>
+              <a:rPr lang="en-US" sz="3400" dirty="0">
+                <a:latin typeface="Carlito"/>
+                <a:cs typeface="Carlito"/>
+              </a:rPr>
+              <a:t>Animation</a:t>
+            </a:r>
+            <a:endParaRPr sz="3400" dirty="0">
+              <a:solidFill>
+                <a:schemeClr val="tx2">
+                  <a:lumMod val="20000"/>
+                  <a:lumOff val="80000"/>
+                </a:schemeClr>
+              </a:solidFill>
+              <a:latin typeface="Carlito"/>
+              <a:cs typeface="Carlito"/>
+            </a:endParaRPr>
+          </a:p>
+        </p:txBody>
+      </p:sp>
+      <p:sp>
+        <p:nvSpPr>
+          <p:cNvPr id="5" name="object 5"/>
+          <p:cNvSpPr/>
+          <p:nvPr/>
+        </p:nvSpPr>
+        <p:spPr>
+          <a:xfrm>
+            <a:off x="9816083" y="262127"/>
+            <a:ext cx="1976627" cy="822960"/>
+          </a:xfrm>
+          <a:prstGeom prst="rect">
+            <a:avLst/>
+          </a:prstGeom>
+          <a:blipFill>
+            <a:blip r:embed="rId3" cstate="print"/>
+            <a:stretch>
+              <a:fillRect/>
+            </a:stretch>
+          </a:blipFill>
+        </p:spPr>
+        <p:txBody>
+          <a:bodyPr wrap="square" lIns="0" tIns="0" rIns="0" bIns="0" rtlCol="0"/>
+          <a:lstStyle/>
+          <a:p>
+            <a:endParaRPr/>
+          </a:p>
+        </p:txBody>
+      </p:sp>
+      <p:sp>
+        <p:nvSpPr>
+          <p:cNvPr id="7" name="TextBox 6">
+            <a:extLst>
+              <a:ext uri="{FF2B5EF4-FFF2-40B4-BE49-F238E27FC236}">
+                <a16:creationId xmlns:a16="http://schemas.microsoft.com/office/drawing/2014/main" id="{C2428796-F632-00B4-E484-CA738D260150}"/>
+              </a:ext>
+            </a:extLst>
+          </p:cNvPr>
+          <p:cNvSpPr txBox="1"/>
+          <p:nvPr/>
+        </p:nvSpPr>
+        <p:spPr>
+          <a:xfrm>
+            <a:off x="533400" y="990600"/>
+            <a:ext cx="11582400" cy="6001643"/>
+          </a:xfrm>
+          <a:prstGeom prst="rect">
+            <a:avLst/>
+          </a:prstGeom>
+          <a:noFill/>
+        </p:spPr>
+        <p:txBody>
+          <a:bodyPr wrap="square" rtlCol="0">
+            <a:spAutoFit/>
+          </a:bodyPr>
+          <a:lstStyle/>
+          <a:p>
+            <a:r>
+              <a:rPr lang="en-US" sz="3200" dirty="0">
+                <a:solidFill>
+                  <a:schemeClr val="bg1"/>
+                </a:solidFill>
+                <a:latin typeface="+mj-lt"/>
+                <a:sym typeface="Wingdings" panose="05000000000000000000" pitchFamily="2" charset="2"/>
+              </a:rPr>
+              <a:t>@keyframes : key points in animation (e.g. @keyframes -name-)</a:t>
+            </a:r>
+          </a:p>
+          <a:p>
+            <a:r>
+              <a:rPr lang="en-US" sz="3200" dirty="0">
+                <a:solidFill>
+                  <a:schemeClr val="bg1"/>
+                </a:solidFill>
+                <a:latin typeface="+mj-lt"/>
+                <a:sym typeface="Wingdings" panose="05000000000000000000" pitchFamily="2" charset="2"/>
+              </a:rPr>
+              <a:t>Now include that -name- and give duration in  </a:t>
+            </a:r>
+          </a:p>
+          <a:p>
+            <a:r>
+              <a:rPr lang="en-US" sz="3200" dirty="0">
+                <a:solidFill>
+                  <a:schemeClr val="bg1"/>
+                </a:solidFill>
+                <a:latin typeface="+mj-lt"/>
+                <a:sym typeface="Wingdings" panose="05000000000000000000" pitchFamily="2" charset="2"/>
+              </a:rPr>
+              <a:t>1. animation-name: -name-</a:t>
+            </a:r>
+          </a:p>
+          <a:p>
+            <a:r>
+              <a:rPr lang="en-US" sz="3200" dirty="0">
+                <a:solidFill>
+                  <a:schemeClr val="bg1"/>
+                </a:solidFill>
+                <a:latin typeface="+mj-lt"/>
+                <a:sym typeface="Wingdings" panose="05000000000000000000" pitchFamily="2" charset="2"/>
+              </a:rPr>
+              <a:t>2. animation-duration:2s</a:t>
+            </a:r>
+          </a:p>
+          <a:p>
+            <a:r>
+              <a:rPr lang="en-US" sz="3200" dirty="0">
+                <a:solidFill>
+                  <a:schemeClr val="bg1"/>
+                </a:solidFill>
+                <a:latin typeface="+mj-lt"/>
+                <a:sym typeface="Wingdings" panose="05000000000000000000" pitchFamily="2" charset="2"/>
+              </a:rPr>
+              <a:t>Now for 2 states we can use ‘from’ then ‘to’ </a:t>
+            </a:r>
+          </a:p>
+          <a:p>
+            <a:endParaRPr lang="en-US" sz="3200" dirty="0">
+              <a:solidFill>
+                <a:schemeClr val="bg1"/>
+              </a:solidFill>
+              <a:latin typeface="+mj-lt"/>
+              <a:sym typeface="Wingdings" panose="05000000000000000000" pitchFamily="2" charset="2"/>
+            </a:endParaRPr>
+          </a:p>
+          <a:p>
+            <a:r>
+              <a:rPr lang="en-US" sz="3200" dirty="0">
+                <a:solidFill>
+                  <a:schemeClr val="bg1"/>
+                </a:solidFill>
+                <a:latin typeface="+mj-lt"/>
+                <a:sym typeface="Wingdings" panose="05000000000000000000" pitchFamily="2" charset="2"/>
+              </a:rPr>
+              <a:t>But for more we will need 0% to 100% then 20% etc.</a:t>
+            </a:r>
+          </a:p>
+          <a:p>
+            <a:r>
+              <a:rPr lang="en-US" sz="3200" dirty="0">
+                <a:solidFill>
+                  <a:schemeClr val="bg1"/>
+                </a:solidFill>
+                <a:latin typeface="+mj-lt"/>
+                <a:sym typeface="Wingdings" panose="05000000000000000000" pitchFamily="2" charset="2"/>
+              </a:rPr>
+              <a:t>3. animation-timing-function: ease-in, ease-out, ease-in-out, linear</a:t>
+            </a:r>
+          </a:p>
+          <a:p>
+            <a:r>
+              <a:rPr lang="en-US" sz="3200" dirty="0">
+                <a:solidFill>
+                  <a:schemeClr val="bg1"/>
+                </a:solidFill>
+                <a:sym typeface="Wingdings" panose="05000000000000000000" pitchFamily="2" charset="2"/>
+              </a:rPr>
+              <a:t>4.</a:t>
+            </a:r>
+            <a:r>
+              <a:rPr lang="en-IN" sz="3200" dirty="0">
+                <a:solidFill>
+                  <a:schemeClr val="bg1"/>
+                </a:solidFill>
+              </a:rPr>
+              <a:t> animation-iteration-count: infinite;(any number)</a:t>
+            </a:r>
+          </a:p>
+          <a:p>
+            <a:r>
+              <a:rPr lang="en-US" sz="3200" dirty="0">
+                <a:solidFill>
+                  <a:schemeClr val="bg1"/>
+                </a:solidFill>
+                <a:sym typeface="Wingdings" panose="05000000000000000000" pitchFamily="2" charset="2"/>
+              </a:rPr>
+              <a:t>5.</a:t>
+            </a:r>
+            <a:r>
+              <a:rPr lang="en-IN" sz="3200" dirty="0">
+                <a:solidFill>
+                  <a:schemeClr val="bg1"/>
+                </a:solidFill>
+              </a:rPr>
+              <a:t> animation-direction: normal, reverse, alternate-reverse, alternate</a:t>
+            </a:r>
+          </a:p>
+          <a:p>
+            <a:r>
+              <a:rPr lang="en-IN" sz="3200" dirty="0">
+                <a:solidFill>
+                  <a:schemeClr val="bg1"/>
+                </a:solidFill>
+                <a:sym typeface="Wingdings" panose="05000000000000000000" pitchFamily="2" charset="2"/>
+              </a:rPr>
+              <a:t>6.</a:t>
+            </a:r>
+            <a:r>
+              <a:rPr lang="en-IN" sz="3200" dirty="0">
+                <a:solidFill>
+                  <a:schemeClr val="bg1"/>
+                </a:solidFill>
+              </a:rPr>
+              <a:t> animation-fill-mode: </a:t>
+            </a:r>
+            <a:r>
+              <a:rPr lang="en-IN" sz="3200" dirty="0" err="1">
+                <a:solidFill>
+                  <a:schemeClr val="bg1"/>
+                </a:solidFill>
+              </a:rPr>
+              <a:t>forwards,backwards</a:t>
+            </a:r>
+            <a:r>
+              <a:rPr lang="en-IN" sz="3200" dirty="0">
+                <a:solidFill>
+                  <a:schemeClr val="bg1"/>
+                </a:solidFill>
+              </a:rPr>
+              <a:t>;</a:t>
+            </a:r>
+          </a:p>
+          <a:p>
+            <a:r>
+              <a:rPr lang="en-IN" sz="3200" dirty="0">
+                <a:solidFill>
+                  <a:schemeClr val="bg1"/>
+                </a:solidFill>
+              </a:rPr>
+              <a:t>7.animation-play-state: </a:t>
+            </a:r>
+            <a:r>
+              <a:rPr lang="en-IN" sz="3200" dirty="0" err="1">
+                <a:solidFill>
+                  <a:schemeClr val="bg1"/>
+                </a:solidFill>
+              </a:rPr>
+              <a:t>running,paused</a:t>
+            </a:r>
+            <a:r>
+              <a:rPr lang="en-IN" sz="3200" dirty="0">
+                <a:solidFill>
+                  <a:schemeClr val="bg1"/>
+                </a:solidFill>
+              </a:rPr>
+              <a:t>;(refer </a:t>
+            </a:r>
+            <a:r>
+              <a:rPr lang="en-IN" sz="3200" dirty="0" err="1">
+                <a:solidFill>
+                  <a:schemeClr val="bg1"/>
+                </a:solidFill>
+              </a:rPr>
+              <a:t>mdn</a:t>
+            </a:r>
+            <a:r>
+              <a:rPr lang="en-IN" sz="3200" dirty="0">
+                <a:solidFill>
+                  <a:schemeClr val="bg1"/>
+                </a:solidFill>
+              </a:rPr>
+              <a:t> for more)</a:t>
+            </a:r>
+            <a:endParaRPr lang="en-US" sz="3200" dirty="0">
+              <a:solidFill>
+                <a:schemeClr val="bg1"/>
+              </a:solidFill>
+              <a:latin typeface="+mj-lt"/>
+              <a:sym typeface="Wingdings" panose="05000000000000000000" pitchFamily="2" charset="2"/>
+            </a:endParaRPr>
+          </a:p>
+        </p:txBody>
+      </p:sp>
+    </p:spTree>
+    <p:extLst>
+      <p:ext uri="{BB962C8B-B14F-4D97-AF65-F5344CB8AC3E}">
+        <p14:creationId xmlns:p14="http://schemas.microsoft.com/office/powerpoint/2010/main" val="1995838260"/>
+      </p:ext>
+    </p:extLst>
+  </p:cSld>
+  <p:clrMapOvr>
+    <a:masterClrMapping/>
+  </p:clrMapOvr>
+</p:sld>
+</file>
+
+<file path=ppt/slides/slide45.xml><?xml version="1.0" encoding="utf-8"?>
+<p:sld xmlns:a="http://schemas.openxmlformats.org/drawingml/2006/main" xmlns:r="http://schemas.openxmlformats.org/officeDocument/2006/relationships" xmlns:p="http://schemas.openxmlformats.org/presentationml/2006/main">
+  <p:cSld>
+    <p:spTree>
+      <p:nvGrpSpPr>
+        <p:cNvPr id="1" name=""/>
+        <p:cNvGrpSpPr/>
+        <p:nvPr/>
+      </p:nvGrpSpPr>
+      <p:grpSpPr>
+        <a:xfrm>
+          <a:off x="0" y="0"/>
+          <a:ext cx="0" cy="0"/>
+          <a:chOff x="0" y="0"/>
+          <a:chExt cx="0" cy="0"/>
+        </a:xfrm>
+      </p:grpSpPr>
+      <p:sp>
+        <p:nvSpPr>
+          <p:cNvPr id="2" name="object 2"/>
+          <p:cNvSpPr/>
+          <p:nvPr/>
+        </p:nvSpPr>
+        <p:spPr>
+          <a:xfrm>
+            <a:off x="1" y="24581"/>
+            <a:ext cx="12191999" cy="7118601"/>
+          </a:xfrm>
+          <a:prstGeom prst="rect">
+            <a:avLst/>
+          </a:prstGeom>
+          <a:blipFill>
+            <a:blip r:embed="rId2" cstate="print"/>
+            <a:stretch>
+              <a:fillRect/>
+            </a:stretch>
+          </a:blipFill>
+        </p:spPr>
+        <p:txBody>
+          <a:bodyPr wrap="square" lIns="0" tIns="0" rIns="0" bIns="0" rtlCol="0"/>
+          <a:lstStyle/>
+          <a:p>
+            <a:endParaRPr b="1" dirty="0">
+              <a:ln w="13462">
+                <a:solidFill>
+                  <a:schemeClr val="bg1"/>
+                </a:solidFill>
+                <a:prstDash val="solid"/>
+              </a:ln>
+              <a:solidFill>
+                <a:schemeClr val="tx1">
+                  <a:lumMod val="85000"/>
+                  <a:lumOff val="15000"/>
+                </a:schemeClr>
+              </a:solidFill>
+              <a:effectLst>
+                <a:outerShdw dist="38100" dir="2700000" algn="bl" rotWithShape="0">
+                  <a:schemeClr val="accent5"/>
+                </a:outerShdw>
+              </a:effectLst>
+            </a:endParaRPr>
+          </a:p>
+        </p:txBody>
+      </p:sp>
+      <p:sp>
+        <p:nvSpPr>
+          <p:cNvPr id="3" name="object 3"/>
+          <p:cNvSpPr txBox="1">
+            <a:spLocks noGrp="1"/>
+          </p:cNvSpPr>
+          <p:nvPr>
+            <p:ph type="title"/>
+          </p:nvPr>
+        </p:nvSpPr>
+        <p:spPr>
+          <a:xfrm>
+            <a:off x="609600" y="533400"/>
+            <a:ext cx="4471315" cy="535403"/>
+          </a:xfrm>
+          <a:prstGeom prst="rect">
+            <a:avLst/>
+          </a:prstGeom>
+        </p:spPr>
+        <p:txBody>
+          <a:bodyPr vert="horz" wrap="square" lIns="0" tIns="12065" rIns="0" bIns="0" rtlCol="0">
+            <a:spAutoFit/>
+          </a:bodyPr>
+          <a:lstStyle/>
+          <a:p>
+            <a:pPr marL="12700">
+              <a:lnSpc>
+                <a:spcPct val="100000"/>
+              </a:lnSpc>
+              <a:spcBef>
+                <a:spcPts val="95"/>
+              </a:spcBef>
+            </a:pPr>
+            <a:r>
+              <a:rPr lang="en-US" sz="3400" dirty="0">
+                <a:latin typeface="Carlito"/>
+                <a:cs typeface="Carlito"/>
+              </a:rPr>
+              <a:t>CSS Variables</a:t>
+            </a:r>
+            <a:endParaRPr sz="3400" dirty="0">
+              <a:solidFill>
+                <a:schemeClr val="tx2">
+                  <a:lumMod val="20000"/>
+                  <a:lumOff val="80000"/>
+                </a:schemeClr>
+              </a:solidFill>
+              <a:latin typeface="Carlito"/>
+              <a:cs typeface="Carlito"/>
+            </a:endParaRPr>
+          </a:p>
+        </p:txBody>
+      </p:sp>
+      <p:sp>
+        <p:nvSpPr>
+          <p:cNvPr id="5" name="object 5"/>
+          <p:cNvSpPr/>
+          <p:nvPr/>
+        </p:nvSpPr>
+        <p:spPr>
+          <a:xfrm>
+            <a:off x="9816083" y="262127"/>
+            <a:ext cx="1976627" cy="822960"/>
+          </a:xfrm>
+          <a:prstGeom prst="rect">
+            <a:avLst/>
+          </a:prstGeom>
+          <a:blipFill>
+            <a:blip r:embed="rId3" cstate="print"/>
+            <a:stretch>
+              <a:fillRect/>
+            </a:stretch>
+          </a:blipFill>
+        </p:spPr>
+        <p:txBody>
+          <a:bodyPr wrap="square" lIns="0" tIns="0" rIns="0" bIns="0" rtlCol="0"/>
+          <a:lstStyle/>
+          <a:p>
+            <a:endParaRPr/>
+          </a:p>
+        </p:txBody>
+      </p:sp>
+      <p:sp>
+        <p:nvSpPr>
+          <p:cNvPr id="7" name="TextBox 6">
+            <a:extLst>
+              <a:ext uri="{FF2B5EF4-FFF2-40B4-BE49-F238E27FC236}">
+                <a16:creationId xmlns:a16="http://schemas.microsoft.com/office/drawing/2014/main" id="{C2428796-F632-00B4-E484-CA738D260150}"/>
+              </a:ext>
+            </a:extLst>
+          </p:cNvPr>
+          <p:cNvSpPr txBox="1"/>
+          <p:nvPr/>
+        </p:nvSpPr>
+        <p:spPr>
+          <a:xfrm>
+            <a:off x="533400" y="1114485"/>
+            <a:ext cx="11582400" cy="5509200"/>
+          </a:xfrm>
+          <a:prstGeom prst="rect">
+            <a:avLst/>
+          </a:prstGeom>
+          <a:noFill/>
+        </p:spPr>
+        <p:txBody>
+          <a:bodyPr wrap="square" rtlCol="0">
+            <a:spAutoFit/>
+          </a:bodyPr>
+          <a:lstStyle/>
+          <a:p>
+            <a:r>
+              <a:rPr lang="en-US" sz="3200" dirty="0">
+                <a:solidFill>
+                  <a:schemeClr val="bg1"/>
+                </a:solidFill>
+                <a:latin typeface="+mj-lt"/>
+                <a:sym typeface="Wingdings" panose="05000000000000000000" pitchFamily="2" charset="2"/>
+              </a:rPr>
+              <a:t>We make 1 property as </a:t>
+            </a:r>
+            <a:r>
+              <a:rPr lang="en-US" sz="3200" dirty="0" err="1">
+                <a:solidFill>
+                  <a:schemeClr val="bg1"/>
+                </a:solidFill>
+                <a:latin typeface="+mj-lt"/>
+                <a:sym typeface="Wingdings" panose="05000000000000000000" pitchFamily="2" charset="2"/>
+              </a:rPr>
+              <a:t>varibales</a:t>
+            </a:r>
+            <a:r>
+              <a:rPr lang="en-US" sz="3200" dirty="0">
+                <a:solidFill>
+                  <a:schemeClr val="bg1"/>
+                </a:solidFill>
+                <a:latin typeface="+mj-lt"/>
+                <a:sym typeface="Wingdings" panose="05000000000000000000" pitchFamily="2" charset="2"/>
+              </a:rPr>
+              <a:t> and use it anywhere.</a:t>
+            </a:r>
+          </a:p>
+          <a:p>
+            <a:r>
+              <a:rPr lang="en-US" sz="3200" dirty="0">
+                <a:solidFill>
+                  <a:schemeClr val="bg1"/>
+                </a:solidFill>
+                <a:latin typeface="+mj-lt"/>
+                <a:sym typeface="Wingdings" panose="05000000000000000000" pitchFamily="2" charset="2"/>
+              </a:rPr>
+              <a:t>Then we make a scope :</a:t>
+            </a:r>
+          </a:p>
+          <a:p>
+            <a:r>
+              <a:rPr lang="en-US" sz="3200" dirty="0">
+                <a:solidFill>
+                  <a:schemeClr val="bg1"/>
+                </a:solidFill>
+                <a:latin typeface="+mj-lt"/>
+                <a:sym typeface="Wingdings" panose="05000000000000000000" pitchFamily="2" charset="2"/>
+              </a:rPr>
+              <a:t>:root{ (root is scope)</a:t>
+            </a:r>
+          </a:p>
+          <a:p>
+            <a:r>
+              <a:rPr lang="en-US" sz="3200" dirty="0">
+                <a:solidFill>
+                  <a:schemeClr val="bg1"/>
+                </a:solidFill>
+                <a:latin typeface="+mj-lt"/>
+                <a:sym typeface="Wingdings" panose="05000000000000000000" pitchFamily="2" charset="2"/>
+              </a:rPr>
+              <a:t>	--</a:t>
+            </a:r>
+            <a:r>
+              <a:rPr lang="en-US" sz="3200" dirty="0" err="1">
+                <a:solidFill>
+                  <a:schemeClr val="bg1"/>
+                </a:solidFill>
+                <a:latin typeface="+mj-lt"/>
+                <a:sym typeface="Wingdings" panose="05000000000000000000" pitchFamily="2" charset="2"/>
+              </a:rPr>
+              <a:t>bg</a:t>
+            </a:r>
+            <a:r>
+              <a:rPr lang="en-US" sz="3200" dirty="0">
+                <a:solidFill>
+                  <a:schemeClr val="bg1"/>
+                </a:solidFill>
+                <a:latin typeface="+mj-lt"/>
+                <a:sym typeface="Wingdings" panose="05000000000000000000" pitchFamily="2" charset="2"/>
+              </a:rPr>
+              <a:t>-color: red ; (this is variable)</a:t>
+            </a:r>
+          </a:p>
+          <a:p>
+            <a:r>
+              <a:rPr lang="en-US" sz="3200" dirty="0">
+                <a:solidFill>
+                  <a:schemeClr val="bg1"/>
+                </a:solidFill>
+                <a:latin typeface="+mj-lt"/>
+                <a:sym typeface="Wingdings" panose="05000000000000000000" pitchFamily="2" charset="2"/>
+              </a:rPr>
+              <a:t>}</a:t>
+            </a:r>
+          </a:p>
+          <a:p>
+            <a:r>
+              <a:rPr lang="en-US" sz="3200" dirty="0">
+                <a:solidFill>
+                  <a:schemeClr val="bg1"/>
+                </a:solidFill>
+                <a:latin typeface="+mj-lt"/>
+                <a:sym typeface="Wingdings" panose="05000000000000000000" pitchFamily="2" charset="2"/>
+              </a:rPr>
+              <a:t>Usage:</a:t>
+            </a:r>
+          </a:p>
+          <a:p>
+            <a:r>
+              <a:rPr lang="en-US" sz="3200" dirty="0">
+                <a:solidFill>
+                  <a:schemeClr val="bg1"/>
+                </a:solidFill>
+                <a:latin typeface="+mj-lt"/>
+                <a:sym typeface="Wingdings" panose="05000000000000000000" pitchFamily="2" charset="2"/>
+              </a:rPr>
+              <a:t>.</a:t>
+            </a:r>
+            <a:r>
+              <a:rPr lang="en-US" sz="3200" dirty="0" err="1">
+                <a:solidFill>
+                  <a:schemeClr val="bg1"/>
+                </a:solidFill>
+                <a:latin typeface="+mj-lt"/>
+                <a:sym typeface="Wingdings" panose="05000000000000000000" pitchFamily="2" charset="2"/>
+              </a:rPr>
+              <a:t>className</a:t>
+            </a:r>
+            <a:r>
+              <a:rPr lang="en-US" sz="3200" dirty="0">
+                <a:solidFill>
+                  <a:schemeClr val="bg1"/>
+                </a:solidFill>
+                <a:latin typeface="+mj-lt"/>
+                <a:sym typeface="Wingdings" panose="05000000000000000000" pitchFamily="2" charset="2"/>
+              </a:rPr>
+              <a:t>{</a:t>
+            </a:r>
+          </a:p>
+          <a:p>
+            <a:r>
+              <a:rPr lang="en-US" sz="3200" dirty="0">
+                <a:solidFill>
+                  <a:schemeClr val="bg1"/>
+                </a:solidFill>
+                <a:latin typeface="+mj-lt"/>
+                <a:sym typeface="Wingdings" panose="05000000000000000000" pitchFamily="2" charset="2"/>
+              </a:rPr>
+              <a:t>	color: var(--</a:t>
+            </a:r>
+            <a:r>
+              <a:rPr lang="en-US" sz="3200" dirty="0" err="1">
+                <a:solidFill>
+                  <a:schemeClr val="bg1"/>
+                </a:solidFill>
+                <a:latin typeface="+mj-lt"/>
+                <a:sym typeface="Wingdings" panose="05000000000000000000" pitchFamily="2" charset="2"/>
+              </a:rPr>
+              <a:t>bg</a:t>
+            </a:r>
+            <a:r>
+              <a:rPr lang="en-US" sz="3200" dirty="0">
+                <a:solidFill>
+                  <a:schemeClr val="bg1"/>
+                </a:solidFill>
+                <a:latin typeface="+mj-lt"/>
+                <a:sym typeface="Wingdings" panose="05000000000000000000" pitchFamily="2" charset="2"/>
+              </a:rPr>
+              <a:t>-color);</a:t>
+            </a:r>
+          </a:p>
+          <a:p>
+            <a:r>
+              <a:rPr lang="en-US" sz="3200" dirty="0">
+                <a:solidFill>
+                  <a:schemeClr val="bg1"/>
+                </a:solidFill>
+                <a:latin typeface="+mj-lt"/>
+                <a:sym typeface="Wingdings" panose="05000000000000000000" pitchFamily="2" charset="2"/>
+              </a:rPr>
+              <a:t>}</a:t>
+            </a:r>
+          </a:p>
+          <a:p>
+            <a:r>
+              <a:rPr lang="en-US" sz="3200" dirty="0">
+                <a:solidFill>
+                  <a:schemeClr val="bg1"/>
+                </a:solidFill>
+                <a:latin typeface="+mj-lt"/>
+                <a:sym typeface="Wingdings" panose="05000000000000000000" pitchFamily="2" charset="2"/>
+              </a:rPr>
+              <a:t>Why to use ?  DRY - Do not repeat yourself (more preferred)</a:t>
+            </a:r>
+          </a:p>
+          <a:p>
+            <a:r>
+              <a:rPr lang="en-US" sz="3200" dirty="0">
+                <a:solidFill>
+                  <a:schemeClr val="bg1"/>
+                </a:solidFill>
+                <a:latin typeface="+mj-lt"/>
+                <a:sym typeface="Wingdings" panose="05000000000000000000" pitchFamily="2" charset="2"/>
+              </a:rPr>
+              <a:t>			WET - Write Everything Twice (less preferred)</a:t>
+            </a:r>
+          </a:p>
+        </p:txBody>
+      </p:sp>
+    </p:spTree>
+    <p:extLst>
+      <p:ext uri="{BB962C8B-B14F-4D97-AF65-F5344CB8AC3E}">
+        <p14:creationId xmlns:p14="http://schemas.microsoft.com/office/powerpoint/2010/main" val="2597486865"/>
+      </p:ext>
+    </p:extLst>
+  </p:cSld>
+  <p:clrMapOvr>
+    <a:masterClrMapping/>
+  </p:clrMapOvr>
+</p:sld>
+</file>
+
+<file path=ppt/slides/slide46.xml><?xml version="1.0" encoding="utf-8"?>
+<p:sld xmlns:a="http://schemas.openxmlformats.org/drawingml/2006/main" xmlns:r="http://schemas.openxmlformats.org/officeDocument/2006/relationships" xmlns:p="http://schemas.openxmlformats.org/presentationml/2006/main">
+  <p:cSld>
+    <p:spTree>
+      <p:nvGrpSpPr>
+        <p:cNvPr id="1" name=""/>
+        <p:cNvGrpSpPr/>
+        <p:nvPr/>
+      </p:nvGrpSpPr>
+      <p:grpSpPr>
+        <a:xfrm>
+          <a:off x="0" y="0"/>
+          <a:ext cx="0" cy="0"/>
+          <a:chOff x="0" y="0"/>
+          <a:chExt cx="0" cy="0"/>
+        </a:xfrm>
+      </p:grpSpPr>
+      <p:sp>
+        <p:nvSpPr>
+          <p:cNvPr id="2" name="object 2"/>
+          <p:cNvSpPr/>
+          <p:nvPr/>
+        </p:nvSpPr>
+        <p:spPr>
+          <a:xfrm>
+            <a:off x="1" y="24581"/>
+            <a:ext cx="12191999" cy="7118601"/>
+          </a:xfrm>
+          <a:prstGeom prst="rect">
+            <a:avLst/>
+          </a:prstGeom>
+          <a:blipFill>
+            <a:blip r:embed="rId2" cstate="print"/>
+            <a:stretch>
+              <a:fillRect/>
+            </a:stretch>
+          </a:blipFill>
+        </p:spPr>
+        <p:txBody>
+          <a:bodyPr wrap="square" lIns="0" tIns="0" rIns="0" bIns="0" rtlCol="0"/>
+          <a:lstStyle/>
+          <a:p>
+            <a:endParaRPr b="1" dirty="0">
+              <a:ln w="13462">
+                <a:solidFill>
+                  <a:schemeClr val="bg1"/>
+                </a:solidFill>
+                <a:prstDash val="solid"/>
+              </a:ln>
+              <a:solidFill>
+                <a:schemeClr val="tx1">
+                  <a:lumMod val="85000"/>
+                  <a:lumOff val="15000"/>
+                </a:schemeClr>
+              </a:solidFill>
+              <a:effectLst>
+                <a:outerShdw dist="38100" dir="2700000" algn="bl" rotWithShape="0">
+                  <a:schemeClr val="accent5"/>
+                </a:outerShdw>
+              </a:effectLst>
+            </a:endParaRPr>
+          </a:p>
+        </p:txBody>
+      </p:sp>
+      <p:sp>
+        <p:nvSpPr>
+          <p:cNvPr id="3" name="object 3"/>
+          <p:cNvSpPr txBox="1">
+            <a:spLocks noGrp="1"/>
+          </p:cNvSpPr>
+          <p:nvPr>
+            <p:ph type="title"/>
+          </p:nvPr>
+        </p:nvSpPr>
+        <p:spPr>
+          <a:xfrm>
+            <a:off x="609600" y="533400"/>
+            <a:ext cx="4471315" cy="535403"/>
+          </a:xfrm>
+          <a:prstGeom prst="rect">
+            <a:avLst/>
+          </a:prstGeom>
+        </p:spPr>
+        <p:txBody>
+          <a:bodyPr vert="horz" wrap="square" lIns="0" tIns="12065" rIns="0" bIns="0" rtlCol="0">
+            <a:spAutoFit/>
+          </a:bodyPr>
+          <a:lstStyle/>
+          <a:p>
+            <a:pPr marL="12700">
+              <a:lnSpc>
+                <a:spcPct val="100000"/>
+              </a:lnSpc>
+              <a:spcBef>
+                <a:spcPts val="95"/>
+              </a:spcBef>
+            </a:pPr>
+            <a:r>
+              <a:rPr lang="en-US" sz="3400" dirty="0">
+                <a:latin typeface="Carlito"/>
+                <a:cs typeface="Carlito"/>
+              </a:rPr>
+              <a:t>Bootstrap</a:t>
+            </a:r>
+            <a:endParaRPr sz="3400" dirty="0">
+              <a:solidFill>
+                <a:schemeClr val="tx2">
+                  <a:lumMod val="20000"/>
+                  <a:lumOff val="80000"/>
+                </a:schemeClr>
+              </a:solidFill>
+              <a:latin typeface="Carlito"/>
+              <a:cs typeface="Carlito"/>
+            </a:endParaRPr>
+          </a:p>
+        </p:txBody>
+      </p:sp>
+      <p:sp>
+        <p:nvSpPr>
+          <p:cNvPr id="5" name="object 5"/>
+          <p:cNvSpPr/>
+          <p:nvPr/>
+        </p:nvSpPr>
+        <p:spPr>
+          <a:xfrm>
+            <a:off x="9816083" y="262127"/>
+            <a:ext cx="1976627" cy="822960"/>
+          </a:xfrm>
+          <a:prstGeom prst="rect">
+            <a:avLst/>
+          </a:prstGeom>
+          <a:blipFill>
+            <a:blip r:embed="rId3" cstate="print"/>
+            <a:stretch>
+              <a:fillRect/>
+            </a:stretch>
+          </a:blipFill>
+        </p:spPr>
+        <p:txBody>
+          <a:bodyPr wrap="square" lIns="0" tIns="0" rIns="0" bIns="0" rtlCol="0"/>
+          <a:lstStyle/>
+          <a:p>
+            <a:endParaRPr/>
+          </a:p>
+        </p:txBody>
+      </p:sp>
+      <p:sp>
+        <p:nvSpPr>
+          <p:cNvPr id="7" name="TextBox 6">
+            <a:extLst>
+              <a:ext uri="{FF2B5EF4-FFF2-40B4-BE49-F238E27FC236}">
+                <a16:creationId xmlns:a16="http://schemas.microsoft.com/office/drawing/2014/main" id="{C2428796-F632-00B4-E484-CA738D260150}"/>
+              </a:ext>
+            </a:extLst>
+          </p:cNvPr>
+          <p:cNvSpPr txBox="1"/>
+          <p:nvPr/>
+        </p:nvSpPr>
+        <p:spPr>
+          <a:xfrm>
+            <a:off x="533400" y="1114485"/>
+            <a:ext cx="11582400" cy="5509200"/>
+          </a:xfrm>
+          <a:prstGeom prst="rect">
+            <a:avLst/>
+          </a:prstGeom>
+          <a:noFill/>
+        </p:spPr>
+        <p:txBody>
+          <a:bodyPr wrap="square" rtlCol="0">
+            <a:spAutoFit/>
+          </a:bodyPr>
+          <a:lstStyle/>
+          <a:p>
+            <a:r>
+              <a:rPr lang="en-US" sz="3200" dirty="0">
+                <a:solidFill>
+                  <a:schemeClr val="bg1"/>
+                </a:solidFill>
+                <a:latin typeface="+mj-lt"/>
+                <a:sym typeface="Wingdings" panose="05000000000000000000" pitchFamily="2" charset="2"/>
+              </a:rPr>
+              <a:t>It’s a framework.</a:t>
+            </a:r>
+          </a:p>
+          <a:p>
+            <a:r>
+              <a:rPr lang="en-US" sz="3200" dirty="0">
+                <a:solidFill>
+                  <a:schemeClr val="bg1"/>
+                </a:solidFill>
+                <a:latin typeface="+mj-lt"/>
+                <a:sym typeface="Wingdings" panose="05000000000000000000" pitchFamily="2" charset="2"/>
+              </a:rPr>
+              <a:t>Other frameworks : 1.Bulma 2.Semantic UI 3. Material UI 4.Tailwind</a:t>
+            </a:r>
+          </a:p>
+          <a:p>
+            <a:endParaRPr lang="en-US" sz="3200" dirty="0">
+              <a:solidFill>
+                <a:schemeClr val="bg1"/>
+              </a:solidFill>
+              <a:latin typeface="+mj-lt"/>
+              <a:sym typeface="Wingdings" panose="05000000000000000000" pitchFamily="2" charset="2"/>
+            </a:endParaRPr>
+          </a:p>
+          <a:p>
+            <a:r>
+              <a:rPr lang="en-US" sz="3200" dirty="0">
+                <a:solidFill>
+                  <a:schemeClr val="bg1"/>
+                </a:solidFill>
+                <a:latin typeface="+mj-lt"/>
+                <a:sym typeface="Wingdings" panose="05000000000000000000" pitchFamily="2" charset="2"/>
+              </a:rPr>
+              <a:t>How to use it?</a:t>
+            </a:r>
+          </a:p>
+          <a:p>
+            <a:r>
+              <a:rPr lang="en-US" sz="3200" dirty="0">
+                <a:solidFill>
+                  <a:schemeClr val="bg1"/>
+                </a:solidFill>
+                <a:latin typeface="+mj-lt"/>
+                <a:sym typeface="Wingdings" panose="05000000000000000000" pitchFamily="2" charset="2"/>
+              </a:rPr>
+              <a:t>Via Copying and Pasting CDN-&gt; Content Delivery Network </a:t>
+            </a:r>
+          </a:p>
+          <a:p>
+            <a:endParaRPr lang="en-US" sz="3200" dirty="0">
+              <a:solidFill>
+                <a:schemeClr val="bg1"/>
+              </a:solidFill>
+              <a:latin typeface="+mj-lt"/>
+              <a:sym typeface="Wingdings" panose="05000000000000000000" pitchFamily="2" charset="2"/>
+            </a:endParaRPr>
+          </a:p>
+          <a:p>
+            <a:r>
+              <a:rPr lang="en-US" sz="3200" dirty="0">
+                <a:solidFill>
+                  <a:schemeClr val="bg1"/>
+                </a:solidFill>
+                <a:latin typeface="Carlito"/>
+                <a:cs typeface="Carlito"/>
+              </a:rPr>
+              <a:t>Container</a:t>
+            </a:r>
+            <a:endParaRPr lang="en-US" sz="3200" dirty="0">
+              <a:solidFill>
+                <a:schemeClr val="bg1"/>
+              </a:solidFill>
+              <a:latin typeface="+mj-lt"/>
+              <a:sym typeface="Wingdings" panose="05000000000000000000" pitchFamily="2" charset="2"/>
+            </a:endParaRPr>
+          </a:p>
+          <a:p>
+            <a:r>
+              <a:rPr lang="en-IN" sz="3200" dirty="0">
+                <a:solidFill>
+                  <a:schemeClr val="bg1"/>
+                </a:solidFill>
+              </a:rPr>
+              <a:t>It is default grid system.</a:t>
+            </a:r>
+          </a:p>
+          <a:p>
+            <a:pPr marL="457200" indent="-457200">
+              <a:buFont typeface="Wingdings" panose="05000000000000000000" pitchFamily="2" charset="2"/>
+              <a:buChar char="è"/>
+            </a:pPr>
+            <a:r>
+              <a:rPr lang="en-US" altLang="en-US" sz="3200" dirty="0">
+                <a:solidFill>
+                  <a:schemeClr val="bg1"/>
+                </a:solidFill>
+              </a:rPr>
+              <a:t>.container-{breakpoint}, which is width: 100% until the specified breakpoint</a:t>
+            </a:r>
+          </a:p>
+          <a:p>
+            <a:endParaRPr lang="en-US" sz="3200" dirty="0">
+              <a:solidFill>
+                <a:schemeClr val="bg1"/>
+              </a:solidFill>
+              <a:latin typeface="+mj-lt"/>
+              <a:sym typeface="Wingdings" panose="05000000000000000000" pitchFamily="2" charset="2"/>
+            </a:endParaRPr>
+          </a:p>
+        </p:txBody>
+      </p:sp>
+    </p:spTree>
+    <p:extLst>
+      <p:ext uri="{BB962C8B-B14F-4D97-AF65-F5344CB8AC3E}">
+        <p14:creationId xmlns:p14="http://schemas.microsoft.com/office/powerpoint/2010/main" val="2012661021"/>
+      </p:ext>
+    </p:extLst>
+  </p:cSld>
+  <p:clrMapOvr>
+    <a:masterClrMapping/>
+  </p:clrMapOvr>
+</p:sld>
+</file>
+
+<file path=ppt/slides/slide47.xml><?xml version="1.0" encoding="utf-8"?>
+<p:sld xmlns:a="http://schemas.openxmlformats.org/drawingml/2006/main" xmlns:r="http://schemas.openxmlformats.org/officeDocument/2006/relationships" xmlns:p="http://schemas.openxmlformats.org/presentationml/2006/main">
+  <p:cSld>
+    <p:spTree>
+      <p:nvGrpSpPr>
+        <p:cNvPr id="1" name=""/>
+        <p:cNvGrpSpPr/>
+        <p:nvPr/>
+      </p:nvGrpSpPr>
+      <p:grpSpPr>
+        <a:xfrm>
+          <a:off x="0" y="0"/>
+          <a:ext cx="0" cy="0"/>
+          <a:chOff x="0" y="0"/>
+          <a:chExt cx="0" cy="0"/>
+        </a:xfrm>
+      </p:grpSpPr>
+      <p:sp>
+        <p:nvSpPr>
+          <p:cNvPr id="2" name="object 2"/>
+          <p:cNvSpPr/>
+          <p:nvPr/>
+        </p:nvSpPr>
+        <p:spPr>
+          <a:xfrm>
+            <a:off x="1" y="24581"/>
+            <a:ext cx="12191999" cy="7118601"/>
+          </a:xfrm>
+          <a:prstGeom prst="rect">
+            <a:avLst/>
+          </a:prstGeom>
+          <a:blipFill>
+            <a:blip r:embed="rId2" cstate="print"/>
+            <a:stretch>
+              <a:fillRect/>
+            </a:stretch>
+          </a:blipFill>
+        </p:spPr>
+        <p:txBody>
+          <a:bodyPr wrap="square" lIns="0" tIns="0" rIns="0" bIns="0" rtlCol="0"/>
+          <a:lstStyle/>
+          <a:p>
+            <a:endParaRPr b="1" dirty="0">
+              <a:ln w="13462">
+                <a:solidFill>
+                  <a:schemeClr val="bg1"/>
+                </a:solidFill>
+                <a:prstDash val="solid"/>
+              </a:ln>
+              <a:solidFill>
+                <a:schemeClr val="tx1">
+                  <a:lumMod val="85000"/>
+                  <a:lumOff val="15000"/>
+                </a:schemeClr>
+              </a:solidFill>
+              <a:effectLst>
+                <a:outerShdw dist="38100" dir="2700000" algn="bl" rotWithShape="0">
+                  <a:schemeClr val="accent5"/>
+                </a:outerShdw>
+              </a:effectLst>
+            </a:endParaRPr>
+          </a:p>
+        </p:txBody>
+      </p:sp>
+      <p:sp>
+        <p:nvSpPr>
+          <p:cNvPr id="3" name="object 3"/>
+          <p:cNvSpPr txBox="1">
+            <a:spLocks noGrp="1"/>
+          </p:cNvSpPr>
+          <p:nvPr>
+            <p:ph type="title"/>
+          </p:nvPr>
+        </p:nvSpPr>
+        <p:spPr>
+          <a:xfrm>
+            <a:off x="609600" y="533400"/>
+            <a:ext cx="4471315" cy="535403"/>
+          </a:xfrm>
+          <a:prstGeom prst="rect">
+            <a:avLst/>
+          </a:prstGeom>
+        </p:spPr>
+        <p:txBody>
+          <a:bodyPr vert="horz" wrap="square" lIns="0" tIns="12065" rIns="0" bIns="0" rtlCol="0">
+            <a:spAutoFit/>
+          </a:bodyPr>
+          <a:lstStyle/>
+          <a:p>
+            <a:pPr marL="12700">
+              <a:lnSpc>
+                <a:spcPct val="100000"/>
+              </a:lnSpc>
+              <a:spcBef>
+                <a:spcPts val="95"/>
+              </a:spcBef>
+            </a:pPr>
+            <a:r>
+              <a:rPr lang="en-US" sz="3400" dirty="0">
+                <a:solidFill>
+                  <a:schemeClr val="bg1"/>
+                </a:solidFill>
+                <a:latin typeface="Carlito"/>
+                <a:cs typeface="Carlito"/>
+              </a:rPr>
+              <a:t>Grid</a:t>
+            </a:r>
+            <a:endParaRPr sz="3400" dirty="0">
+              <a:solidFill>
+                <a:schemeClr val="bg1"/>
+              </a:solidFill>
+              <a:latin typeface="Carlito"/>
+              <a:cs typeface="Carlito"/>
+            </a:endParaRPr>
+          </a:p>
+        </p:txBody>
+      </p:sp>
+      <p:sp>
+        <p:nvSpPr>
+          <p:cNvPr id="5" name="object 5"/>
+          <p:cNvSpPr/>
+          <p:nvPr/>
+        </p:nvSpPr>
+        <p:spPr>
+          <a:xfrm>
+            <a:off x="9816083" y="262127"/>
+            <a:ext cx="1976627" cy="822960"/>
+          </a:xfrm>
+          <a:prstGeom prst="rect">
+            <a:avLst/>
+          </a:prstGeom>
+          <a:blipFill>
+            <a:blip r:embed="rId3" cstate="print"/>
+            <a:stretch>
+              <a:fillRect/>
+            </a:stretch>
+          </a:blipFill>
+        </p:spPr>
+        <p:txBody>
+          <a:bodyPr wrap="square" lIns="0" tIns="0" rIns="0" bIns="0" rtlCol="0"/>
+          <a:lstStyle/>
+          <a:p>
+            <a:endParaRPr/>
+          </a:p>
+        </p:txBody>
+      </p:sp>
+      <p:sp>
+        <p:nvSpPr>
+          <p:cNvPr id="7" name="TextBox 6">
+            <a:extLst>
+              <a:ext uri="{FF2B5EF4-FFF2-40B4-BE49-F238E27FC236}">
+                <a16:creationId xmlns:a16="http://schemas.microsoft.com/office/drawing/2014/main" id="{C2428796-F632-00B4-E484-CA738D260150}"/>
+              </a:ext>
+            </a:extLst>
+          </p:cNvPr>
+          <p:cNvSpPr txBox="1"/>
+          <p:nvPr/>
+        </p:nvSpPr>
+        <p:spPr>
+          <a:xfrm>
+            <a:off x="533400" y="1114485"/>
+            <a:ext cx="11582400" cy="6001643"/>
+          </a:xfrm>
+          <a:prstGeom prst="rect">
+            <a:avLst/>
+          </a:prstGeom>
+          <a:noFill/>
+        </p:spPr>
+        <p:txBody>
+          <a:bodyPr wrap="square" rtlCol="0">
+            <a:spAutoFit/>
+          </a:bodyPr>
+          <a:lstStyle/>
+          <a:p>
+            <a:r>
+              <a:rPr lang="en-US" sz="3200" dirty="0">
+                <a:solidFill>
+                  <a:schemeClr val="bg1"/>
+                </a:solidFill>
+                <a:latin typeface="+mj-lt"/>
+                <a:sym typeface="Wingdings" panose="05000000000000000000" pitchFamily="2" charset="2"/>
+              </a:rPr>
+              <a:t>Working:</a:t>
+            </a:r>
+          </a:p>
+          <a:p>
+            <a:pPr marL="457200" indent="-457200">
+              <a:buFont typeface="Wingdings" panose="05000000000000000000" pitchFamily="2" charset="2"/>
+              <a:buChar char="è"/>
+            </a:pPr>
+            <a:r>
+              <a:rPr lang="en-US" sz="3200" dirty="0">
+                <a:solidFill>
+                  <a:schemeClr val="bg1"/>
+                </a:solidFill>
+                <a:latin typeface="+mj-lt"/>
+                <a:sym typeface="Wingdings" panose="05000000000000000000" pitchFamily="2" charset="2"/>
+              </a:rPr>
+              <a:t>Bootstrap divides the viewport into 12 parts that we can dynamically allocate the contents in our hand.</a:t>
+            </a:r>
+            <a:endParaRPr lang="en-IN" sz="3200" dirty="0">
+              <a:solidFill>
+                <a:schemeClr val="bg1"/>
+              </a:solidFill>
+              <a:latin typeface="+mj-lt"/>
+              <a:sym typeface="Wingdings" panose="05000000000000000000" pitchFamily="2" charset="2"/>
+            </a:endParaRPr>
+          </a:p>
+          <a:p>
+            <a:pPr marL="457200" indent="-457200">
+              <a:buFont typeface="Wingdings" panose="05000000000000000000" pitchFamily="2" charset="2"/>
+              <a:buChar char="è"/>
+            </a:pPr>
+            <a:r>
+              <a:rPr lang="en-IN" sz="3200" dirty="0">
+                <a:solidFill>
+                  <a:schemeClr val="bg1"/>
+                </a:solidFill>
+                <a:latin typeface="+mj-lt"/>
+                <a:sym typeface="Wingdings" panose="05000000000000000000" pitchFamily="2" charset="2"/>
+              </a:rPr>
+              <a:t>To use the default way we specify the container class , inside it give a class row and inside it make all the cols you want to set.</a:t>
+            </a:r>
+          </a:p>
+          <a:p>
+            <a:pPr marL="457200" indent="-457200">
+              <a:buFont typeface="Wingdings" panose="05000000000000000000" pitchFamily="2" charset="2"/>
+              <a:buChar char="è"/>
+            </a:pPr>
+            <a:r>
+              <a:rPr lang="en-IN" sz="3200" dirty="0">
+                <a:solidFill>
+                  <a:schemeClr val="bg1"/>
+                </a:solidFill>
+                <a:latin typeface="+mj-lt"/>
+                <a:sym typeface="Wingdings" panose="05000000000000000000" pitchFamily="2" charset="2"/>
+              </a:rPr>
+              <a:t>To use separate property of space use col-{</a:t>
+            </a:r>
+            <a:r>
+              <a:rPr lang="en-IN" sz="3200" dirty="0" err="1">
+                <a:solidFill>
+                  <a:schemeClr val="bg1"/>
+                </a:solidFill>
+                <a:latin typeface="+mj-lt"/>
+                <a:sym typeface="Wingdings" panose="05000000000000000000" pitchFamily="2" charset="2"/>
+              </a:rPr>
+              <a:t>num</a:t>
+            </a:r>
+            <a:r>
+              <a:rPr lang="en-IN" sz="3200" dirty="0">
+                <a:solidFill>
+                  <a:schemeClr val="bg1"/>
+                </a:solidFill>
+                <a:latin typeface="+mj-lt"/>
+                <a:sym typeface="Wingdings" panose="05000000000000000000" pitchFamily="2" charset="2"/>
+              </a:rPr>
+              <a:t>}.</a:t>
+            </a:r>
+          </a:p>
+          <a:p>
+            <a:pPr marL="457200" indent="-457200">
+              <a:buFont typeface="Wingdings" panose="05000000000000000000" pitchFamily="2" charset="2"/>
+              <a:buChar char="è"/>
+            </a:pPr>
+            <a:r>
+              <a:rPr lang="en-IN" sz="3200" dirty="0">
+                <a:solidFill>
+                  <a:schemeClr val="bg1"/>
+                </a:solidFill>
+                <a:latin typeface="+mj-lt"/>
+                <a:sym typeface="Wingdings" panose="05000000000000000000" pitchFamily="2" charset="2"/>
+              </a:rPr>
+              <a:t>Similarly we can use col-(</a:t>
+            </a:r>
+            <a:r>
+              <a:rPr lang="en-IN" sz="3200" dirty="0" err="1">
+                <a:solidFill>
+                  <a:schemeClr val="bg1"/>
+                </a:solidFill>
+                <a:latin typeface="+mj-lt"/>
+                <a:sym typeface="Wingdings" panose="05000000000000000000" pitchFamily="2" charset="2"/>
+              </a:rPr>
+              <a:t>lg,md,sm</a:t>
+            </a:r>
+            <a:r>
+              <a:rPr lang="en-IN" sz="3200" dirty="0">
+                <a:solidFill>
+                  <a:schemeClr val="bg1"/>
+                </a:solidFill>
+                <a:latin typeface="+mj-lt"/>
+                <a:sym typeface="Wingdings" panose="05000000000000000000" pitchFamily="2" charset="2"/>
+              </a:rPr>
+              <a:t>)-{</a:t>
+            </a:r>
+            <a:r>
+              <a:rPr lang="en-IN" sz="3200" dirty="0" err="1">
+                <a:solidFill>
+                  <a:schemeClr val="bg1"/>
+                </a:solidFill>
+                <a:latin typeface="+mj-lt"/>
+                <a:sym typeface="Wingdings" panose="05000000000000000000" pitchFamily="2" charset="2"/>
+              </a:rPr>
+              <a:t>num</a:t>
+            </a:r>
+            <a:r>
+              <a:rPr lang="en-IN" sz="3200" dirty="0">
+                <a:solidFill>
+                  <a:schemeClr val="bg1"/>
+                </a:solidFill>
+                <a:latin typeface="+mj-lt"/>
+                <a:sym typeface="Wingdings" panose="05000000000000000000" pitchFamily="2" charset="2"/>
+              </a:rPr>
+              <a:t>} for specifying grids while specifying screen size.</a:t>
+            </a:r>
+            <a:endParaRPr lang="en-US" sz="3200" dirty="0">
+              <a:solidFill>
+                <a:schemeClr val="bg1"/>
+              </a:solidFill>
+              <a:latin typeface="+mj-lt"/>
+              <a:sym typeface="Wingdings" panose="05000000000000000000" pitchFamily="2" charset="2"/>
+            </a:endParaRPr>
+          </a:p>
+          <a:p>
+            <a:pPr marL="457200" indent="-457200">
+              <a:buFont typeface="Wingdings" panose="05000000000000000000" pitchFamily="2" charset="2"/>
+              <a:buChar char="è"/>
+            </a:pPr>
+            <a:endParaRPr lang="en-US" altLang="en-US" sz="3200" dirty="0">
+              <a:solidFill>
+                <a:schemeClr val="bg1"/>
+              </a:solidFill>
+            </a:endParaRPr>
+          </a:p>
+          <a:p>
+            <a:endParaRPr lang="en-IN" sz="3200" dirty="0">
+              <a:solidFill>
+                <a:schemeClr val="bg1"/>
+              </a:solidFill>
+              <a:sym typeface="Wingdings" panose="05000000000000000000" pitchFamily="2" charset="2"/>
+            </a:endParaRPr>
+          </a:p>
+          <a:p>
+            <a:endParaRPr lang="en-US" sz="3200" dirty="0">
+              <a:solidFill>
+                <a:schemeClr val="bg1"/>
+              </a:solidFill>
+              <a:sym typeface="Wingdings" panose="05000000000000000000" pitchFamily="2" charset="2"/>
+            </a:endParaRPr>
+          </a:p>
+          <a:p>
+            <a:endParaRPr lang="en-US" sz="3200" dirty="0">
+              <a:solidFill>
+                <a:schemeClr val="bg1"/>
+              </a:solidFill>
+              <a:latin typeface="+mj-lt"/>
+              <a:sym typeface="Wingdings" panose="05000000000000000000" pitchFamily="2" charset="2"/>
+            </a:endParaRPr>
+          </a:p>
+        </p:txBody>
+      </p:sp>
+    </p:spTree>
+    <p:extLst>
+      <p:ext uri="{BB962C8B-B14F-4D97-AF65-F5344CB8AC3E}">
+        <p14:creationId xmlns:p14="http://schemas.microsoft.com/office/powerpoint/2010/main" val="3665282198"/>
+      </p:ext>
+    </p:extLst>
+  </p:cSld>
+  <p:clrMapOvr>
+    <a:masterClrMapping/>
+  </p:clrMapOvr>
+</p:sld>
+</file>
+
+<file path=ppt/slides/slide48.xml><?xml version="1.0" encoding="utf-8"?>
+<p:sld xmlns:a="http://schemas.openxmlformats.org/drawingml/2006/main" xmlns:r="http://schemas.openxmlformats.org/officeDocument/2006/relationships" xmlns:p="http://schemas.openxmlformats.org/presentationml/2006/main">
+  <p:cSld>
+    <p:spTree>
+      <p:nvGrpSpPr>
+        <p:cNvPr id="1" name=""/>
+        <p:cNvGrpSpPr/>
+        <p:nvPr/>
+      </p:nvGrpSpPr>
+      <p:grpSpPr>
+        <a:xfrm>
+          <a:off x="0" y="0"/>
+          <a:ext cx="0" cy="0"/>
+          <a:chOff x="0" y="0"/>
+          <a:chExt cx="0" cy="0"/>
+        </a:xfrm>
+      </p:grpSpPr>
+      <p:sp>
+        <p:nvSpPr>
+          <p:cNvPr id="2" name="object 2"/>
+          <p:cNvSpPr/>
+          <p:nvPr/>
+        </p:nvSpPr>
+        <p:spPr>
+          <a:xfrm>
+            <a:off x="1" y="24581"/>
+            <a:ext cx="12191999" cy="7118601"/>
+          </a:xfrm>
+          <a:prstGeom prst="rect">
+            <a:avLst/>
+          </a:prstGeom>
+          <a:blipFill>
+            <a:blip r:embed="rId2" cstate="print"/>
+            <a:stretch>
+              <a:fillRect/>
+            </a:stretch>
+          </a:blipFill>
+        </p:spPr>
+        <p:txBody>
+          <a:bodyPr wrap="square" lIns="0" tIns="0" rIns="0" bIns="0" rtlCol="0"/>
+          <a:lstStyle/>
+          <a:p>
+            <a:endParaRPr b="1" dirty="0">
+              <a:ln w="13462">
+                <a:solidFill>
+                  <a:schemeClr val="bg1"/>
+                </a:solidFill>
+                <a:prstDash val="solid"/>
+              </a:ln>
+              <a:solidFill>
+                <a:schemeClr val="tx1">
+                  <a:lumMod val="85000"/>
+                  <a:lumOff val="15000"/>
+                </a:schemeClr>
+              </a:solidFill>
+              <a:effectLst>
+                <a:outerShdw dist="38100" dir="2700000" algn="bl" rotWithShape="0">
+                  <a:schemeClr val="accent5"/>
+                </a:outerShdw>
+              </a:effectLst>
+            </a:endParaRPr>
+          </a:p>
+        </p:txBody>
+      </p:sp>
+      <p:sp>
+        <p:nvSpPr>
+          <p:cNvPr id="3" name="object 3"/>
+          <p:cNvSpPr txBox="1">
+            <a:spLocks noGrp="1"/>
+          </p:cNvSpPr>
+          <p:nvPr>
+            <p:ph type="title"/>
+          </p:nvPr>
+        </p:nvSpPr>
+        <p:spPr>
+          <a:xfrm>
+            <a:off x="609600" y="533400"/>
+            <a:ext cx="8001000" cy="535403"/>
+          </a:xfrm>
+          <a:prstGeom prst="rect">
+            <a:avLst/>
+          </a:prstGeom>
+        </p:spPr>
+        <p:txBody>
+          <a:bodyPr vert="horz" wrap="square" lIns="0" tIns="12065" rIns="0" bIns="0" rtlCol="0">
+            <a:spAutoFit/>
+          </a:bodyPr>
+          <a:lstStyle/>
+          <a:p>
+            <a:pPr marL="12700">
+              <a:lnSpc>
+                <a:spcPct val="100000"/>
+              </a:lnSpc>
+              <a:spcBef>
+                <a:spcPts val="95"/>
+              </a:spcBef>
+            </a:pPr>
+            <a:r>
+              <a:rPr lang="en-US" sz="3400" dirty="0">
+                <a:solidFill>
+                  <a:schemeClr val="bg1"/>
+                </a:solidFill>
+                <a:latin typeface="Carlito"/>
+                <a:cs typeface="Carlito"/>
+              </a:rPr>
+              <a:t>Making a website using Bootstrap.</a:t>
+            </a:r>
+            <a:endParaRPr sz="3400" dirty="0">
+              <a:solidFill>
+                <a:schemeClr val="bg1"/>
+              </a:solidFill>
+              <a:latin typeface="Carlito"/>
+              <a:cs typeface="Carlito"/>
+            </a:endParaRPr>
+          </a:p>
+        </p:txBody>
+      </p:sp>
+      <p:sp>
+        <p:nvSpPr>
+          <p:cNvPr id="5" name="object 5"/>
+          <p:cNvSpPr/>
+          <p:nvPr/>
+        </p:nvSpPr>
+        <p:spPr>
+          <a:xfrm>
+            <a:off x="9816083" y="262127"/>
+            <a:ext cx="1976627" cy="822960"/>
+          </a:xfrm>
+          <a:prstGeom prst="rect">
+            <a:avLst/>
+          </a:prstGeom>
+          <a:blipFill>
+            <a:blip r:embed="rId3" cstate="print"/>
+            <a:stretch>
+              <a:fillRect/>
+            </a:stretch>
+          </a:blipFill>
+        </p:spPr>
+        <p:txBody>
+          <a:bodyPr wrap="square" lIns="0" tIns="0" rIns="0" bIns="0" rtlCol="0"/>
+          <a:lstStyle/>
+          <a:p>
+            <a:endParaRPr/>
+          </a:p>
+        </p:txBody>
+      </p:sp>
+      <p:sp>
+        <p:nvSpPr>
+          <p:cNvPr id="7" name="TextBox 6">
+            <a:extLst>
+              <a:ext uri="{FF2B5EF4-FFF2-40B4-BE49-F238E27FC236}">
+                <a16:creationId xmlns:a16="http://schemas.microsoft.com/office/drawing/2014/main" id="{C2428796-F632-00B4-E484-CA738D260150}"/>
+              </a:ext>
+            </a:extLst>
+          </p:cNvPr>
+          <p:cNvSpPr txBox="1"/>
+          <p:nvPr/>
+        </p:nvSpPr>
+        <p:spPr>
+          <a:xfrm>
+            <a:off x="533400" y="1114485"/>
+            <a:ext cx="11582400" cy="5016758"/>
+          </a:xfrm>
+          <a:prstGeom prst="rect">
+            <a:avLst/>
+          </a:prstGeom>
+          <a:noFill/>
+        </p:spPr>
+        <p:txBody>
+          <a:bodyPr wrap="square" rtlCol="0">
+            <a:spAutoFit/>
+          </a:bodyPr>
+          <a:lstStyle/>
+          <a:p>
+            <a:r>
+              <a:rPr lang="en-US" altLang="en-US" sz="3200" dirty="0">
+                <a:solidFill>
+                  <a:schemeClr val="bg1"/>
+                </a:solidFill>
+              </a:rPr>
+              <a:t>Take the main parts of a website.</a:t>
+            </a:r>
+          </a:p>
+          <a:p>
+            <a:r>
+              <a:rPr lang="en-US" altLang="en-US" sz="3200" dirty="0">
+                <a:solidFill>
+                  <a:schemeClr val="bg1"/>
+                </a:solidFill>
+              </a:rPr>
+              <a:t>1.Header Main and Footer</a:t>
+            </a:r>
+          </a:p>
+          <a:p>
+            <a:r>
+              <a:rPr lang="en-US" altLang="en-US" sz="3200" dirty="0">
+                <a:solidFill>
+                  <a:schemeClr val="bg1"/>
+                </a:solidFill>
+              </a:rPr>
+              <a:t>2.Take a navbar from documentation.</a:t>
+            </a:r>
+          </a:p>
+          <a:p>
+            <a:r>
+              <a:rPr lang="en-US" altLang="en-US" sz="3200" dirty="0">
+                <a:solidFill>
+                  <a:schemeClr val="bg1"/>
+                </a:solidFill>
+              </a:rPr>
+              <a:t>3.Make Carousel and cards inside the main.(</a:t>
+            </a:r>
+            <a:r>
+              <a:rPr lang="en-US" altLang="en-US" sz="3200" dirty="0" err="1">
+                <a:solidFill>
+                  <a:schemeClr val="bg1"/>
+                </a:solidFill>
+              </a:rPr>
+              <a:t>img</a:t>
+            </a:r>
+            <a:r>
+              <a:rPr lang="en-US" altLang="en-US" sz="3200" dirty="0">
+                <a:solidFill>
+                  <a:schemeClr val="bg1"/>
+                </a:solidFill>
+              </a:rPr>
+              <a:t>-fluid)</a:t>
+            </a:r>
+          </a:p>
+          <a:p>
+            <a:r>
+              <a:rPr lang="en-US" altLang="en-US" sz="3200" dirty="0">
+                <a:solidFill>
+                  <a:schemeClr val="bg1"/>
+                </a:solidFill>
+              </a:rPr>
+              <a:t>4.Gutters : To provide spacing between the cards or elements layout.</a:t>
+            </a:r>
+          </a:p>
+          <a:p>
+            <a:r>
+              <a:rPr lang="en-US" altLang="en-US" sz="3200" dirty="0">
+                <a:solidFill>
+                  <a:schemeClr val="bg1"/>
+                </a:solidFill>
+              </a:rPr>
+              <a:t>(e.g. </a:t>
+            </a:r>
+            <a:r>
+              <a:rPr lang="en-US" altLang="en-US" sz="3200" dirty="0" err="1">
+                <a:solidFill>
+                  <a:schemeClr val="bg1"/>
+                </a:solidFill>
+              </a:rPr>
+              <a:t>gx</a:t>
+            </a:r>
+            <a:r>
+              <a:rPr lang="en-US" altLang="en-US" sz="3200" dirty="0">
+                <a:solidFill>
+                  <a:schemeClr val="bg1"/>
+                </a:solidFill>
+              </a:rPr>
+              <a:t>-(0-5) , </a:t>
+            </a:r>
+            <a:r>
+              <a:rPr lang="en-US" altLang="en-US" sz="3200" dirty="0" err="1">
+                <a:solidFill>
+                  <a:schemeClr val="bg1"/>
+                </a:solidFill>
+              </a:rPr>
+              <a:t>gy</a:t>
+            </a:r>
+            <a:r>
+              <a:rPr lang="en-US" altLang="en-US" sz="3200" dirty="0">
+                <a:solidFill>
+                  <a:schemeClr val="bg1"/>
+                </a:solidFill>
+              </a:rPr>
+              <a:t>-(0-5))</a:t>
+            </a:r>
+          </a:p>
+          <a:p>
+            <a:r>
+              <a:rPr lang="en-US" altLang="en-US" sz="3200" dirty="0">
+                <a:solidFill>
+                  <a:schemeClr val="bg1"/>
+                </a:solidFill>
+              </a:rPr>
+              <a:t>5.We can also include ‘FORM’ ( from documentation )</a:t>
+            </a:r>
+          </a:p>
+          <a:p>
+            <a:r>
+              <a:rPr lang="en-US" sz="3200" dirty="0">
+                <a:solidFill>
+                  <a:schemeClr val="bg1"/>
+                </a:solidFill>
+                <a:sym typeface="Wingdings" panose="05000000000000000000" pitchFamily="2" charset="2"/>
+              </a:rPr>
+              <a:t>6.Buttons : primary, secondary </a:t>
+            </a:r>
+            <a:r>
+              <a:rPr lang="en-US" sz="3200" dirty="0" err="1">
+                <a:solidFill>
+                  <a:schemeClr val="bg1"/>
+                </a:solidFill>
+                <a:sym typeface="Wingdings" panose="05000000000000000000" pitchFamily="2" charset="2"/>
+              </a:rPr>
+              <a:t>etc</a:t>
+            </a:r>
+            <a:endParaRPr lang="en-US" sz="3200" dirty="0">
+              <a:solidFill>
+                <a:schemeClr val="bg1"/>
+              </a:solidFill>
+              <a:sym typeface="Wingdings" panose="05000000000000000000" pitchFamily="2" charset="2"/>
+            </a:endParaRPr>
+          </a:p>
+          <a:p>
+            <a:r>
+              <a:rPr lang="en-US" sz="3200" dirty="0">
+                <a:solidFill>
+                  <a:schemeClr val="bg1"/>
+                </a:solidFill>
+                <a:latin typeface="+mj-lt"/>
+                <a:sym typeface="Wingdings" panose="05000000000000000000" pitchFamily="2" charset="2"/>
+              </a:rPr>
+              <a:t>7.Spinners </a:t>
+            </a:r>
+          </a:p>
+          <a:p>
+            <a:r>
+              <a:rPr lang="en-US" sz="3200" dirty="0">
+                <a:solidFill>
+                  <a:schemeClr val="bg1"/>
+                </a:solidFill>
+                <a:latin typeface="+mj-lt"/>
+                <a:sym typeface="Wingdings" panose="05000000000000000000" pitchFamily="2" charset="2"/>
+              </a:rPr>
+              <a:t>8.Margin : mx and my / Padding: </a:t>
+            </a:r>
+            <a:r>
+              <a:rPr lang="en-US" sz="3200" dirty="0" err="1">
+                <a:solidFill>
+                  <a:schemeClr val="bg1"/>
+                </a:solidFill>
+                <a:latin typeface="+mj-lt"/>
+                <a:sym typeface="Wingdings" panose="05000000000000000000" pitchFamily="2" charset="2"/>
+              </a:rPr>
+              <a:t>px</a:t>
+            </a:r>
+            <a:r>
+              <a:rPr lang="en-US" sz="3200" dirty="0">
+                <a:solidFill>
+                  <a:schemeClr val="bg1"/>
+                </a:solidFill>
+                <a:latin typeface="+mj-lt"/>
+                <a:sym typeface="Wingdings" panose="05000000000000000000" pitchFamily="2" charset="2"/>
+              </a:rPr>
+              <a:t> and </a:t>
+            </a:r>
+            <a:r>
+              <a:rPr lang="en-US" sz="3200" dirty="0" err="1">
+                <a:solidFill>
+                  <a:schemeClr val="bg1"/>
+                </a:solidFill>
+                <a:latin typeface="+mj-lt"/>
+                <a:sym typeface="Wingdings" panose="05000000000000000000" pitchFamily="2" charset="2"/>
+              </a:rPr>
+              <a:t>py</a:t>
+            </a:r>
+            <a:endParaRPr lang="en-US" sz="3200" dirty="0">
+              <a:solidFill>
+                <a:schemeClr val="bg1"/>
+              </a:solidFill>
+              <a:latin typeface="+mj-lt"/>
+              <a:sym typeface="Wingdings" panose="05000000000000000000" pitchFamily="2" charset="2"/>
+            </a:endParaRPr>
+          </a:p>
+        </p:txBody>
+      </p:sp>
+    </p:spTree>
+    <p:extLst>
+      <p:ext uri="{BB962C8B-B14F-4D97-AF65-F5344CB8AC3E}">
+        <p14:creationId xmlns:p14="http://schemas.microsoft.com/office/powerpoint/2010/main" val="3718312698"/>
       </p:ext>
     </p:extLst>
   </p:cSld>

</xml_diff>